<commit_message>
updated return type and added api endpoint. Presentation updates with change
</commit_message>
<xml_diff>
--- a/SAS Interview Presentation.pptx
+++ b/SAS Interview Presentation.pptx
@@ -5,24 +5,26 @@
     <p:sldMasterId id="2147483666" r:id="rId4"/>
   </p:sldMasterIdLst>
   <p:notesMasterIdLst>
-    <p:notesMasterId r:id="rId17"/>
+    <p:notesMasterId r:id="rId19"/>
   </p:notesMasterIdLst>
   <p:handoutMasterIdLst>
-    <p:handoutMasterId r:id="rId18"/>
+    <p:handoutMasterId r:id="rId20"/>
   </p:handoutMasterIdLst>
   <p:sldIdLst>
     <p:sldId id="256" r:id="rId5"/>
-    <p:sldId id="277" r:id="rId6"/>
-    <p:sldId id="262" r:id="rId7"/>
-    <p:sldId id="299" r:id="rId8"/>
-    <p:sldId id="298" r:id="rId9"/>
-    <p:sldId id="301" r:id="rId10"/>
-    <p:sldId id="268" r:id="rId11"/>
-    <p:sldId id="303" r:id="rId12"/>
-    <p:sldId id="304" r:id="rId13"/>
-    <p:sldId id="305" r:id="rId14"/>
-    <p:sldId id="296" r:id="rId15"/>
-    <p:sldId id="276" r:id="rId16"/>
+    <p:sldId id="306" r:id="rId6"/>
+    <p:sldId id="307" r:id="rId7"/>
+    <p:sldId id="277" r:id="rId8"/>
+    <p:sldId id="262" r:id="rId9"/>
+    <p:sldId id="299" r:id="rId10"/>
+    <p:sldId id="298" r:id="rId11"/>
+    <p:sldId id="301" r:id="rId12"/>
+    <p:sldId id="268" r:id="rId13"/>
+    <p:sldId id="303" r:id="rId14"/>
+    <p:sldId id="304" r:id="rId15"/>
+    <p:sldId id="305" r:id="rId16"/>
+    <p:sldId id="296" r:id="rId17"/>
+    <p:sldId id="276" r:id="rId18"/>
   </p:sldIdLst>
   <p:sldSz cx="12192000" cy="6858000"/>
   <p:notesSz cx="6858000" cy="9144000"/>
@@ -249,7 +251,7 @@
           <a:p>
             <a:fld id="{F352A77B-D33C-49B3-A83C-450AA2ED72B3}" type="datetimeFigureOut">
               <a:rPr lang="en-US" smtClean="0"/>
-              <a:t>3/9/2022</a:t>
+              <a:t>3/10/2022</a:t>
             </a:fld>
             <a:endParaRPr lang="en-US" dirty="0"/>
           </a:p>
@@ -426,7 +428,7 @@
           <a:p>
             <a:fld id="{E38D8F9A-F5CB-4EF8-A859-ED5E107B9763}" type="datetimeFigureOut">
               <a:rPr lang="en-US" smtClean="0"/>
-              <a:t>3/9/2022</a:t>
+              <a:t>3/10/2022</a:t>
             </a:fld>
             <a:endParaRPr lang="en-US" dirty="0"/>
           </a:p>
@@ -16070,10 +16072,10 @@
       </p:grpSpPr>
       <p:sp>
         <p:nvSpPr>
-          <p:cNvPr id="2" name="Title 1">
-            <a:extLst>
-              <a:ext uri="{FF2B5EF4-FFF2-40B4-BE49-F238E27FC236}">
-                <a16:creationId xmlns:a16="http://schemas.microsoft.com/office/drawing/2014/main" id="{5CE54ABB-4929-4810-950B-2DAEA0A5BAB4}"/>
+          <p:cNvPr id="4" name="Title 3">
+            <a:extLst>
+              <a:ext uri="{FF2B5EF4-FFF2-40B4-BE49-F238E27FC236}">
+                <a16:creationId xmlns:a16="http://schemas.microsoft.com/office/drawing/2014/main" id="{FAD2AE59-5630-4D5C-83A9-4CDEF4D7DCFB}"/>
               </a:ext>
             </a:extLst>
           </p:cNvPr>
@@ -16086,8 +16088,8 @@
         </p:nvSpPr>
         <p:spPr>
           <a:xfrm>
-            <a:off x="1885156" y="892177"/>
-            <a:ext cx="8421688" cy="1325563"/>
+            <a:off x="3453818" y="323796"/>
+            <a:ext cx="8421688" cy="701731"/>
           </a:xfrm>
         </p:spPr>
         <p:txBody>
@@ -16096,31 +16098,31 @@
           <a:p>
             <a:r>
               <a:rPr lang="en-US" dirty="0"/>
-              <a:t>Challenges</a:t>
-            </a:r>
-          </a:p>
-        </p:txBody>
-      </p:sp>
-      <p:sp>
-        <p:nvSpPr>
-          <p:cNvPr id="4" name="Text Placeholder 3">
-            <a:extLst>
-              <a:ext uri="{FF2B5EF4-FFF2-40B4-BE49-F238E27FC236}">
-                <a16:creationId xmlns:a16="http://schemas.microsoft.com/office/drawing/2014/main" id="{A112B089-A8F9-45B1-BE6E-EAC10163F082}"/>
-              </a:ext>
-            </a:extLst>
-          </p:cNvPr>
-          <p:cNvSpPr>
-            <a:spLocks noGrp="1"/>
-          </p:cNvSpPr>
-          <p:nvPr>
-            <p:ph type="body" idx="1"/>
-          </p:nvPr>
-        </p:nvSpPr>
-        <p:spPr>
-          <a:xfrm>
-            <a:off x="1243103" y="2499517"/>
-            <a:ext cx="2882475" cy="823912"/>
+              <a:t>User Interface</a:t>
+            </a:r>
+          </a:p>
+        </p:txBody>
+      </p:sp>
+      <p:sp>
+        <p:nvSpPr>
+          <p:cNvPr id="12" name="Date Placeholder 11">
+            <a:extLst>
+              <a:ext uri="{FF2B5EF4-FFF2-40B4-BE49-F238E27FC236}">
+                <a16:creationId xmlns:a16="http://schemas.microsoft.com/office/drawing/2014/main" id="{5909F2DC-F097-42AB-88E7-0CA09BD5E2C2}"/>
+              </a:ext>
+            </a:extLst>
+          </p:cNvPr>
+          <p:cNvSpPr>
+            <a:spLocks noGrp="1"/>
+          </p:cNvSpPr>
+          <p:nvPr>
+            <p:ph type="dt" sz="half" idx="10"/>
+          </p:nvPr>
+        </p:nvSpPr>
+        <p:spPr>
+          <a:xfrm>
+            <a:off x="838200" y="6356350"/>
+            <a:ext cx="2743200" cy="365125"/>
           </a:xfrm>
         </p:spPr>
         <p:txBody>
@@ -16128,91 +16130,32 @@
           <a:lstStyle/>
           <a:p>
             <a:r>
-              <a:rPr lang="en-ZA" dirty="0"/>
-              <a:t>User Problem</a:t>
-            </a:r>
-          </a:p>
-          <a:p>
-            <a:r>
-              <a:rPr lang="en-ZA" dirty="0"/>
-              <a:t>Use Case</a:t>
-            </a:r>
-          </a:p>
-        </p:txBody>
-      </p:sp>
-      <p:sp>
-        <p:nvSpPr>
-          <p:cNvPr id="7" name="Content Placeholder 6">
-            <a:extLst>
-              <a:ext uri="{FF2B5EF4-FFF2-40B4-BE49-F238E27FC236}">
-                <a16:creationId xmlns:a16="http://schemas.microsoft.com/office/drawing/2014/main" id="{6B35F89A-6CDF-41F7-BD87-18B45BD7330B}"/>
-              </a:ext>
-            </a:extLst>
-          </p:cNvPr>
-          <p:cNvSpPr>
-            <a:spLocks noGrp="1"/>
-          </p:cNvSpPr>
-          <p:nvPr>
-            <p:ph sz="half" idx="2"/>
-          </p:nvPr>
-        </p:nvSpPr>
-        <p:spPr>
-          <a:xfrm>
-            <a:off x="1243104" y="3534571"/>
-            <a:ext cx="2882475" cy="1997867"/>
-          </a:xfrm>
-        </p:spPr>
-        <p:txBody>
-          <a:bodyPr vert="horz" lIns="91440" tIns="45720" rIns="91440" bIns="45720" rtlCol="0" anchor="t">
-            <a:normAutofit/>
-          </a:bodyPr>
-          <a:lstStyle/>
-          <a:p>
-            <a:r>
-              <a:rPr lang="en-US" noProof="1"/>
-              <a:t>What is the problem to solve? </a:t>
-            </a:r>
-          </a:p>
-          <a:p>
-            <a:r>
-              <a:rPr lang="en-US" noProof="1"/>
-              <a:t>What is the use case for the solution?</a:t>
-            </a:r>
-          </a:p>
-          <a:p>
-            <a:r>
-              <a:rPr lang="en-US" noProof="1"/>
-              <a:t>Lack of stakeholder feedback</a:t>
-            </a:r>
-          </a:p>
-          <a:p>
-            <a:endParaRPr lang="en-ZA" noProof="1"/>
-          </a:p>
-          <a:p>
-            <a:endParaRPr lang="en-ZA" noProof="1"/>
-          </a:p>
-        </p:txBody>
-      </p:sp>
-      <p:sp>
-        <p:nvSpPr>
-          <p:cNvPr id="6" name="Text Placeholder 5">
-            <a:extLst>
-              <a:ext uri="{FF2B5EF4-FFF2-40B4-BE49-F238E27FC236}">
-                <a16:creationId xmlns:a16="http://schemas.microsoft.com/office/drawing/2014/main" id="{0FE22F9B-4BF8-41DC-8F1C-836B546E59AD}"/>
-              </a:ext>
-            </a:extLst>
-          </p:cNvPr>
-          <p:cNvSpPr>
-            <a:spLocks noGrp="1"/>
-          </p:cNvSpPr>
-          <p:nvPr>
-            <p:ph type="body" sz="quarter" idx="3"/>
-          </p:nvPr>
-        </p:nvSpPr>
-        <p:spPr>
-          <a:xfrm>
-            <a:off x="4647665" y="2499517"/>
-            <a:ext cx="2896671" cy="823912"/>
+              <a:rPr lang="en-US" dirty="0"/>
+              <a:t>2022</a:t>
+            </a:r>
+          </a:p>
+        </p:txBody>
+      </p:sp>
+      <p:sp>
+        <p:nvSpPr>
+          <p:cNvPr id="13" name="Footer Placeholder 12">
+            <a:extLst>
+              <a:ext uri="{FF2B5EF4-FFF2-40B4-BE49-F238E27FC236}">
+                <a16:creationId xmlns:a16="http://schemas.microsoft.com/office/drawing/2014/main" id="{F4A37AA9-0BEE-42AC-8CC0-AE5B8663553A}"/>
+              </a:ext>
+            </a:extLst>
+          </p:cNvPr>
+          <p:cNvSpPr>
+            <a:spLocks noGrp="1"/>
+          </p:cNvSpPr>
+          <p:nvPr>
+            <p:ph type="ftr" sz="quarter" idx="11"/>
+          </p:nvPr>
+        </p:nvSpPr>
+        <p:spPr>
+          <a:xfrm>
+            <a:off x="4038600" y="6356350"/>
+            <a:ext cx="4114800" cy="365125"/>
           </a:xfrm>
         </p:spPr>
         <p:txBody>
@@ -16220,189 +16163,6 @@
           <a:lstStyle/>
           <a:p>
             <a:r>
-              <a:rPr lang="en-ZA" dirty="0"/>
-              <a:t>Data</a:t>
-            </a:r>
-          </a:p>
-        </p:txBody>
-      </p:sp>
-      <p:sp>
-        <p:nvSpPr>
-          <p:cNvPr id="3" name="Text Placeholder 2">
-            <a:extLst>
-              <a:ext uri="{FF2B5EF4-FFF2-40B4-BE49-F238E27FC236}">
-                <a16:creationId xmlns:a16="http://schemas.microsoft.com/office/drawing/2014/main" id="{D5E1C399-8F48-44F5-9461-3C89866D4CE1}"/>
-              </a:ext>
-            </a:extLst>
-          </p:cNvPr>
-          <p:cNvSpPr>
-            <a:spLocks noGrp="1"/>
-          </p:cNvSpPr>
-          <p:nvPr>
-            <p:ph sz="quarter" idx="4"/>
-          </p:nvPr>
-        </p:nvSpPr>
-        <p:spPr>
-          <a:xfrm>
-            <a:off x="4647665" y="3534571"/>
-            <a:ext cx="2896671" cy="1997867"/>
-          </a:xfrm>
-        </p:spPr>
-        <p:txBody>
-          <a:bodyPr/>
-          <a:lstStyle/>
-          <a:p>
-            <a:r>
-              <a:rPr lang="en-ZA" dirty="0"/>
-              <a:t>Where is the data?</a:t>
-            </a:r>
-          </a:p>
-          <a:p>
-            <a:r>
-              <a:rPr lang="en-ZA" dirty="0"/>
-              <a:t>Data format</a:t>
-            </a:r>
-          </a:p>
-        </p:txBody>
-      </p:sp>
-      <p:sp>
-        <p:nvSpPr>
-          <p:cNvPr id="5" name="Content Placeholder 4">
-            <a:extLst>
-              <a:ext uri="{FF2B5EF4-FFF2-40B4-BE49-F238E27FC236}">
-                <a16:creationId xmlns:a16="http://schemas.microsoft.com/office/drawing/2014/main" id="{CF515C5D-2CDB-4E66-B2B8-1451BC44247F}"/>
-              </a:ext>
-            </a:extLst>
-          </p:cNvPr>
-          <p:cNvSpPr>
-            <a:spLocks noGrp="1"/>
-          </p:cNvSpPr>
-          <p:nvPr>
-            <p:ph type="body" idx="13"/>
-          </p:nvPr>
-        </p:nvSpPr>
-        <p:spPr>
-          <a:xfrm>
-            <a:off x="8066421" y="2499517"/>
-            <a:ext cx="2882475" cy="823912"/>
-          </a:xfrm>
-        </p:spPr>
-        <p:txBody>
-          <a:bodyPr vert="horz" lIns="91440" tIns="45720" rIns="91440" bIns="45720" rtlCol="0" anchor="b">
-            <a:normAutofit/>
-          </a:bodyPr>
-          <a:lstStyle/>
-          <a:p>
-            <a:r>
-              <a:rPr lang="en-ZA" dirty="0"/>
-              <a:t>Errors to check</a:t>
-            </a:r>
-          </a:p>
-        </p:txBody>
-      </p:sp>
-      <p:sp>
-        <p:nvSpPr>
-          <p:cNvPr id="8" name="Text Placeholder 7">
-            <a:extLst>
-              <a:ext uri="{FF2B5EF4-FFF2-40B4-BE49-F238E27FC236}">
-                <a16:creationId xmlns:a16="http://schemas.microsoft.com/office/drawing/2014/main" id="{E92B9716-8D44-4864-8986-720957B34362}"/>
-              </a:ext>
-            </a:extLst>
-          </p:cNvPr>
-          <p:cNvSpPr>
-            <a:spLocks noGrp="1"/>
-          </p:cNvSpPr>
-          <p:nvPr>
-            <p:ph sz="half" idx="14"/>
-          </p:nvPr>
-        </p:nvSpPr>
-        <p:spPr>
-          <a:xfrm>
-            <a:off x="8066420" y="3534570"/>
-            <a:ext cx="2882475" cy="1997867"/>
-          </a:xfrm>
-        </p:spPr>
-        <p:txBody>
-          <a:bodyPr/>
-          <a:lstStyle/>
-          <a:p>
-            <a:r>
-              <a:rPr lang="en-ZA" noProof="1"/>
-              <a:t>Bad keys, wrong birthday format</a:t>
-            </a:r>
-          </a:p>
-          <a:p>
-            <a:r>
-              <a:rPr lang="en-ZA" noProof="1"/>
-              <a:t>Database injection from UI</a:t>
-            </a:r>
-            <a:endParaRPr lang="en-ZA" dirty="0"/>
-          </a:p>
-          <a:p>
-            <a:endParaRPr lang="en-US" dirty="0"/>
-          </a:p>
-        </p:txBody>
-      </p:sp>
-      <p:sp>
-        <p:nvSpPr>
-          <p:cNvPr id="9" name="Date Placeholder 8">
-            <a:extLst>
-              <a:ext uri="{FF2B5EF4-FFF2-40B4-BE49-F238E27FC236}">
-                <a16:creationId xmlns:a16="http://schemas.microsoft.com/office/drawing/2014/main" id="{7B78F7A0-88C5-4940-B21C-099F472F39F9}"/>
-              </a:ext>
-            </a:extLst>
-          </p:cNvPr>
-          <p:cNvSpPr>
-            <a:spLocks noGrp="1"/>
-          </p:cNvSpPr>
-          <p:nvPr>
-            <p:ph type="dt" sz="half" idx="10"/>
-          </p:nvPr>
-        </p:nvSpPr>
-        <p:spPr>
-          <a:xfrm>
-            <a:off x="838200" y="6356350"/>
-            <a:ext cx="2743200" cy="365125"/>
-          </a:xfrm>
-        </p:spPr>
-        <p:txBody>
-          <a:bodyPr/>
-          <a:lstStyle/>
-          <a:p>
-            <a:r>
-              <a:rPr lang="en-US" dirty="0"/>
-              <a:t>2022</a:t>
-            </a:r>
-          </a:p>
-        </p:txBody>
-      </p:sp>
-      <p:sp>
-        <p:nvSpPr>
-          <p:cNvPr id="10" name="Footer Placeholder 9">
-            <a:extLst>
-              <a:ext uri="{FF2B5EF4-FFF2-40B4-BE49-F238E27FC236}">
-                <a16:creationId xmlns:a16="http://schemas.microsoft.com/office/drawing/2014/main" id="{D2186069-FC8E-433D-9BB4-942220CE8CFB}"/>
-              </a:ext>
-            </a:extLst>
-          </p:cNvPr>
-          <p:cNvSpPr>
-            <a:spLocks noGrp="1"/>
-          </p:cNvSpPr>
-          <p:nvPr>
-            <p:ph type="ftr" sz="quarter" idx="11"/>
-          </p:nvPr>
-        </p:nvSpPr>
-        <p:spPr>
-          <a:xfrm>
-            <a:off x="4038600" y="6356350"/>
-            <a:ext cx="4114800" cy="365125"/>
-          </a:xfrm>
-        </p:spPr>
-        <p:txBody>
-          <a:bodyPr/>
-          <a:lstStyle/>
-          <a:p>
-            <a:r>
               <a:rPr lang="en-US" dirty="0"/>
               <a:t>Maurice M. Materise</a:t>
             </a:r>
@@ -16411,10 +16171,10 @@
       </p:sp>
       <p:sp>
         <p:nvSpPr>
-          <p:cNvPr id="11" name="Slide Number Placeholder 10">
-            <a:extLst>
-              <a:ext uri="{FF2B5EF4-FFF2-40B4-BE49-F238E27FC236}">
-                <a16:creationId xmlns:a16="http://schemas.microsoft.com/office/drawing/2014/main" id="{BAD5B6F4-0A90-447A-A1AE-D75C934B6B29}"/>
+          <p:cNvPr id="14" name="Slide Number Placeholder 13">
+            <a:extLst>
+              <a:ext uri="{FF2B5EF4-FFF2-40B4-BE49-F238E27FC236}">
+                <a16:creationId xmlns:a16="http://schemas.microsoft.com/office/drawing/2014/main" id="{42152A75-1CD2-44EC-9374-C83D4604A5DD}"/>
               </a:ext>
             </a:extLst>
           </p:cNvPr>
@@ -16444,10 +16204,40 @@
           </a:p>
         </p:txBody>
       </p:sp>
+      <p:pic>
+        <p:nvPicPr>
+          <p:cNvPr id="3" name="Picture 2">
+            <a:extLst>
+              <a:ext uri="{FF2B5EF4-FFF2-40B4-BE49-F238E27FC236}">
+                <a16:creationId xmlns:a16="http://schemas.microsoft.com/office/drawing/2014/main" id="{3497C26B-D156-40C1-9AFF-E6C589814A82}"/>
+              </a:ext>
+            </a:extLst>
+          </p:cNvPr>
+          <p:cNvPicPr>
+            <a:picLocks noChangeAspect="1"/>
+          </p:cNvPicPr>
+          <p:nvPr/>
+        </p:nvPicPr>
+        <p:blipFill>
+          <a:blip r:embed="rId2"/>
+          <a:stretch>
+            <a:fillRect/>
+          </a:stretch>
+        </p:blipFill>
+        <p:spPr>
+          <a:xfrm>
+            <a:off x="471181" y="1183048"/>
+            <a:ext cx="11249637" cy="4748474"/>
+          </a:xfrm>
+          <a:prstGeom prst="rect">
+            <a:avLst/>
+          </a:prstGeom>
+        </p:spPr>
+      </p:pic>
     </p:spTree>
     <p:extLst>
       <p:ext uri="{BB962C8B-B14F-4D97-AF65-F5344CB8AC3E}">
-        <p14:creationId xmlns:p14="http://schemas.microsoft.com/office/powerpoint/2010/main" val="290857844"/>
+        <p14:creationId xmlns:p14="http://schemas.microsoft.com/office/powerpoint/2010/main" val="4023078651"/>
       </p:ext>
     </p:extLst>
   </p:cSld>
@@ -16476,10 +16266,10 @@
       </p:grpSpPr>
       <p:sp>
         <p:nvSpPr>
-          <p:cNvPr id="2" name="Title 1">
-            <a:extLst>
-              <a:ext uri="{FF2B5EF4-FFF2-40B4-BE49-F238E27FC236}">
-                <a16:creationId xmlns:a16="http://schemas.microsoft.com/office/drawing/2014/main" id="{38FFA191-5CCC-43CB-BD83-4F80ED362608}"/>
+          <p:cNvPr id="4" name="Title 3">
+            <a:extLst>
+              <a:ext uri="{FF2B5EF4-FFF2-40B4-BE49-F238E27FC236}">
+                <a16:creationId xmlns:a16="http://schemas.microsoft.com/office/drawing/2014/main" id="{FAD2AE59-5630-4D5C-83A9-4CDEF4D7DCFB}"/>
               </a:ext>
             </a:extLst>
           </p:cNvPr>
@@ -16492,8 +16282,8 @@
         </p:nvSpPr>
         <p:spPr>
           <a:xfrm>
-            <a:off x="5476875" y="1671639"/>
-            <a:ext cx="5111750" cy="1204912"/>
+            <a:off x="3453818" y="323796"/>
+            <a:ext cx="8421688" cy="701731"/>
           </a:xfrm>
         </p:spPr>
         <p:txBody>
@@ -16502,72 +16292,17 @@
           <a:p>
             <a:r>
               <a:rPr lang="en-US" dirty="0"/>
-              <a:t>Links</a:t>
-            </a:r>
-          </a:p>
-        </p:txBody>
-      </p:sp>
-      <p:sp>
-        <p:nvSpPr>
-          <p:cNvPr id="3" name="Content Placeholder 2">
-            <a:extLst>
-              <a:ext uri="{FF2B5EF4-FFF2-40B4-BE49-F238E27FC236}">
-                <a16:creationId xmlns:a16="http://schemas.microsoft.com/office/drawing/2014/main" id="{E14BBEAF-B516-45F4-9EF6-A9F65111580F}"/>
-              </a:ext>
-            </a:extLst>
-          </p:cNvPr>
-          <p:cNvSpPr>
-            <a:spLocks noGrp="1"/>
-          </p:cNvSpPr>
-          <p:nvPr>
-            <p:ph type="body" idx="1"/>
-          </p:nvPr>
-        </p:nvSpPr>
-        <p:spPr>
-          <a:xfrm>
-            <a:off x="5476874" y="3194314"/>
-            <a:ext cx="6494216" cy="787136"/>
-          </a:xfrm>
-        </p:spPr>
-        <p:txBody>
-          <a:bodyPr vert="horz" lIns="91440" tIns="45720" rIns="91440" bIns="45720" rtlCol="0" anchor="b">
-            <a:normAutofit/>
-          </a:bodyPr>
-          <a:lstStyle/>
-          <a:p>
-            <a:r>
-              <a:rPr lang="en-US" dirty="0"/>
-              <a:t>Full Code Base: </a:t>
-            </a:r>
-            <a:r>
-              <a:rPr lang="en-US" dirty="0">
-                <a:hlinkClick r:id="rId2"/>
-              </a:rPr>
-              <a:t>https://github.com/materimm/SAS</a:t>
-            </a:r>
-            <a:br>
-              <a:rPr lang="en-US" dirty="0"/>
-            </a:br>
-            <a:r>
-              <a:rPr lang="en-US" dirty="0"/>
-              <a:t>LinkedIn: </a:t>
-            </a:r>
-            <a:r>
-              <a:rPr lang="en-US" dirty="0">
-                <a:hlinkClick r:id="rId3"/>
-              </a:rPr>
-              <a:t>https://www.linkedin.com/in/maurice-materise-72301575/</a:t>
-            </a:r>
-            <a:endParaRPr lang="en-US" dirty="0"/>
-          </a:p>
-        </p:txBody>
-      </p:sp>
-      <p:sp>
-        <p:nvSpPr>
-          <p:cNvPr id="4" name="Date Placeholder 3">
-            <a:extLst>
-              <a:ext uri="{FF2B5EF4-FFF2-40B4-BE49-F238E27FC236}">
-                <a16:creationId xmlns:a16="http://schemas.microsoft.com/office/drawing/2014/main" id="{13F8C8B5-F6EC-489B-BD0F-CD89A73CAB3A}"/>
+              <a:t>User Interface</a:t>
+            </a:r>
+          </a:p>
+        </p:txBody>
+      </p:sp>
+      <p:sp>
+        <p:nvSpPr>
+          <p:cNvPr id="12" name="Date Placeholder 11">
+            <a:extLst>
+              <a:ext uri="{FF2B5EF4-FFF2-40B4-BE49-F238E27FC236}">
+                <a16:creationId xmlns:a16="http://schemas.microsoft.com/office/drawing/2014/main" id="{5909F2DC-F097-42AB-88E7-0CA09BD5E2C2}"/>
               </a:ext>
             </a:extLst>
           </p:cNvPr>
@@ -16597,10 +16332,10 @@
       </p:sp>
       <p:sp>
         <p:nvSpPr>
-          <p:cNvPr id="5" name="Footer Placeholder 4">
-            <a:extLst>
-              <a:ext uri="{FF2B5EF4-FFF2-40B4-BE49-F238E27FC236}">
-                <a16:creationId xmlns:a16="http://schemas.microsoft.com/office/drawing/2014/main" id="{11AEA823-8519-4F9D-81FA-3673131076FC}"/>
+          <p:cNvPr id="13" name="Footer Placeholder 12">
+            <a:extLst>
+              <a:ext uri="{FF2B5EF4-FFF2-40B4-BE49-F238E27FC236}">
+                <a16:creationId xmlns:a16="http://schemas.microsoft.com/office/drawing/2014/main" id="{F4A37AA9-0BEE-42AC-8CC0-AE5B8663553A}"/>
               </a:ext>
             </a:extLst>
           </p:cNvPr>
@@ -16630,10 +16365,10 @@
       </p:sp>
       <p:sp>
         <p:nvSpPr>
-          <p:cNvPr id="6" name="Slide Number Placeholder 5">
-            <a:extLst>
-              <a:ext uri="{FF2B5EF4-FFF2-40B4-BE49-F238E27FC236}">
-                <a16:creationId xmlns:a16="http://schemas.microsoft.com/office/drawing/2014/main" id="{BAEFF51B-0E28-4171-AE7C-A31AAB42BC73}"/>
+          <p:cNvPr id="14" name="Slide Number Placeholder 13">
+            <a:extLst>
+              <a:ext uri="{FF2B5EF4-FFF2-40B4-BE49-F238E27FC236}">
+                <a16:creationId xmlns:a16="http://schemas.microsoft.com/office/drawing/2014/main" id="{42152A75-1CD2-44EC-9374-C83D4604A5DD}"/>
               </a:ext>
             </a:extLst>
           </p:cNvPr>
@@ -16663,10 +16398,40 @@
           </a:p>
         </p:txBody>
       </p:sp>
+      <p:pic>
+        <p:nvPicPr>
+          <p:cNvPr id="5" name="Picture 4">
+            <a:extLst>
+              <a:ext uri="{FF2B5EF4-FFF2-40B4-BE49-F238E27FC236}">
+                <a16:creationId xmlns:a16="http://schemas.microsoft.com/office/drawing/2014/main" id="{5E716540-09D3-45B2-B361-3A31EFEDAB15}"/>
+              </a:ext>
+            </a:extLst>
+          </p:cNvPr>
+          <p:cNvPicPr>
+            <a:picLocks noChangeAspect="1"/>
+          </p:cNvPicPr>
+          <p:nvPr/>
+        </p:nvPicPr>
+        <p:blipFill>
+          <a:blip r:embed="rId2"/>
+          <a:stretch>
+            <a:fillRect/>
+          </a:stretch>
+        </p:blipFill>
+        <p:spPr>
+          <a:xfrm>
+            <a:off x="1045827" y="1440370"/>
+            <a:ext cx="10100345" cy="3378319"/>
+          </a:xfrm>
+          <a:prstGeom prst="rect">
+            <a:avLst/>
+          </a:prstGeom>
+        </p:spPr>
+      </p:pic>
     </p:spTree>
     <p:extLst>
       <p:ext uri="{BB962C8B-B14F-4D97-AF65-F5344CB8AC3E}">
-        <p14:creationId xmlns:p14="http://schemas.microsoft.com/office/powerpoint/2010/main" val="2222089849"/>
+        <p14:creationId xmlns:p14="http://schemas.microsoft.com/office/powerpoint/2010/main" val="3045026754"/>
       </p:ext>
     </p:extLst>
   </p:cSld>
@@ -16698,6 +16463,582 @@
           <p:cNvPr id="2" name="Title 1">
             <a:extLst>
               <a:ext uri="{FF2B5EF4-FFF2-40B4-BE49-F238E27FC236}">
+                <a16:creationId xmlns:a16="http://schemas.microsoft.com/office/drawing/2014/main" id="{5CE54ABB-4929-4810-950B-2DAEA0A5BAB4}"/>
+              </a:ext>
+            </a:extLst>
+          </p:cNvPr>
+          <p:cNvSpPr>
+            <a:spLocks noGrp="1"/>
+          </p:cNvSpPr>
+          <p:nvPr>
+            <p:ph type="title"/>
+          </p:nvPr>
+        </p:nvSpPr>
+        <p:spPr>
+          <a:xfrm>
+            <a:off x="1885156" y="892177"/>
+            <a:ext cx="8421688" cy="1325563"/>
+          </a:xfrm>
+        </p:spPr>
+        <p:txBody>
+          <a:bodyPr/>
+          <a:lstStyle/>
+          <a:p>
+            <a:r>
+              <a:rPr lang="en-US" dirty="0"/>
+              <a:t>Challenges</a:t>
+            </a:r>
+          </a:p>
+        </p:txBody>
+      </p:sp>
+      <p:sp>
+        <p:nvSpPr>
+          <p:cNvPr id="4" name="Text Placeholder 3">
+            <a:extLst>
+              <a:ext uri="{FF2B5EF4-FFF2-40B4-BE49-F238E27FC236}">
+                <a16:creationId xmlns:a16="http://schemas.microsoft.com/office/drawing/2014/main" id="{A112B089-A8F9-45B1-BE6E-EAC10163F082}"/>
+              </a:ext>
+            </a:extLst>
+          </p:cNvPr>
+          <p:cNvSpPr>
+            <a:spLocks noGrp="1"/>
+          </p:cNvSpPr>
+          <p:nvPr>
+            <p:ph type="body" idx="1"/>
+          </p:nvPr>
+        </p:nvSpPr>
+        <p:spPr>
+          <a:xfrm>
+            <a:off x="1243103" y="2499517"/>
+            <a:ext cx="2882475" cy="823912"/>
+          </a:xfrm>
+        </p:spPr>
+        <p:txBody>
+          <a:bodyPr/>
+          <a:lstStyle/>
+          <a:p>
+            <a:r>
+              <a:rPr lang="en-ZA" dirty="0"/>
+              <a:t>User Problem</a:t>
+            </a:r>
+          </a:p>
+          <a:p>
+            <a:r>
+              <a:rPr lang="en-ZA" dirty="0"/>
+              <a:t>Use Case</a:t>
+            </a:r>
+          </a:p>
+        </p:txBody>
+      </p:sp>
+      <p:sp>
+        <p:nvSpPr>
+          <p:cNvPr id="7" name="Content Placeholder 6">
+            <a:extLst>
+              <a:ext uri="{FF2B5EF4-FFF2-40B4-BE49-F238E27FC236}">
+                <a16:creationId xmlns:a16="http://schemas.microsoft.com/office/drawing/2014/main" id="{6B35F89A-6CDF-41F7-BD87-18B45BD7330B}"/>
+              </a:ext>
+            </a:extLst>
+          </p:cNvPr>
+          <p:cNvSpPr>
+            <a:spLocks noGrp="1"/>
+          </p:cNvSpPr>
+          <p:nvPr>
+            <p:ph sz="half" idx="2"/>
+          </p:nvPr>
+        </p:nvSpPr>
+        <p:spPr>
+          <a:xfrm>
+            <a:off x="1243104" y="3534571"/>
+            <a:ext cx="2882475" cy="1997867"/>
+          </a:xfrm>
+        </p:spPr>
+        <p:txBody>
+          <a:bodyPr vert="horz" lIns="91440" tIns="45720" rIns="91440" bIns="45720" rtlCol="0" anchor="t">
+            <a:normAutofit/>
+          </a:bodyPr>
+          <a:lstStyle/>
+          <a:p>
+            <a:r>
+              <a:rPr lang="en-US" noProof="1"/>
+              <a:t>What is the problem to solve? </a:t>
+            </a:r>
+          </a:p>
+          <a:p>
+            <a:r>
+              <a:rPr lang="en-US" noProof="1"/>
+              <a:t>What is the use case for the solution?</a:t>
+            </a:r>
+          </a:p>
+          <a:p>
+            <a:r>
+              <a:rPr lang="en-US" noProof="1"/>
+              <a:t>Lack of stakeholder feedback</a:t>
+            </a:r>
+          </a:p>
+          <a:p>
+            <a:endParaRPr lang="en-ZA" noProof="1"/>
+          </a:p>
+          <a:p>
+            <a:endParaRPr lang="en-ZA" noProof="1"/>
+          </a:p>
+        </p:txBody>
+      </p:sp>
+      <p:sp>
+        <p:nvSpPr>
+          <p:cNvPr id="6" name="Text Placeholder 5">
+            <a:extLst>
+              <a:ext uri="{FF2B5EF4-FFF2-40B4-BE49-F238E27FC236}">
+                <a16:creationId xmlns:a16="http://schemas.microsoft.com/office/drawing/2014/main" id="{0FE22F9B-4BF8-41DC-8F1C-836B546E59AD}"/>
+              </a:ext>
+            </a:extLst>
+          </p:cNvPr>
+          <p:cNvSpPr>
+            <a:spLocks noGrp="1"/>
+          </p:cNvSpPr>
+          <p:nvPr>
+            <p:ph type="body" sz="quarter" idx="3"/>
+          </p:nvPr>
+        </p:nvSpPr>
+        <p:spPr>
+          <a:xfrm>
+            <a:off x="4647665" y="2499517"/>
+            <a:ext cx="2896671" cy="823912"/>
+          </a:xfrm>
+        </p:spPr>
+        <p:txBody>
+          <a:bodyPr/>
+          <a:lstStyle/>
+          <a:p>
+            <a:r>
+              <a:rPr lang="en-ZA" dirty="0"/>
+              <a:t>Data</a:t>
+            </a:r>
+          </a:p>
+        </p:txBody>
+      </p:sp>
+      <p:sp>
+        <p:nvSpPr>
+          <p:cNvPr id="3" name="Text Placeholder 2">
+            <a:extLst>
+              <a:ext uri="{FF2B5EF4-FFF2-40B4-BE49-F238E27FC236}">
+                <a16:creationId xmlns:a16="http://schemas.microsoft.com/office/drawing/2014/main" id="{D5E1C399-8F48-44F5-9461-3C89866D4CE1}"/>
+              </a:ext>
+            </a:extLst>
+          </p:cNvPr>
+          <p:cNvSpPr>
+            <a:spLocks noGrp="1"/>
+          </p:cNvSpPr>
+          <p:nvPr>
+            <p:ph sz="quarter" idx="4"/>
+          </p:nvPr>
+        </p:nvSpPr>
+        <p:spPr>
+          <a:xfrm>
+            <a:off x="4647665" y="3534571"/>
+            <a:ext cx="2896671" cy="1997867"/>
+          </a:xfrm>
+        </p:spPr>
+        <p:txBody>
+          <a:bodyPr/>
+          <a:lstStyle/>
+          <a:p>
+            <a:r>
+              <a:rPr lang="en-ZA" dirty="0"/>
+              <a:t>Where is the data?</a:t>
+            </a:r>
+          </a:p>
+          <a:p>
+            <a:r>
+              <a:rPr lang="en-ZA" dirty="0"/>
+              <a:t>Data format</a:t>
+            </a:r>
+          </a:p>
+          <a:p>
+            <a:r>
+              <a:rPr lang="en-ZA" dirty="0"/>
+              <a:t>Personal Information access</a:t>
+            </a:r>
+          </a:p>
+        </p:txBody>
+      </p:sp>
+      <p:sp>
+        <p:nvSpPr>
+          <p:cNvPr id="5" name="Content Placeholder 4">
+            <a:extLst>
+              <a:ext uri="{FF2B5EF4-FFF2-40B4-BE49-F238E27FC236}">
+                <a16:creationId xmlns:a16="http://schemas.microsoft.com/office/drawing/2014/main" id="{CF515C5D-2CDB-4E66-B2B8-1451BC44247F}"/>
+              </a:ext>
+            </a:extLst>
+          </p:cNvPr>
+          <p:cNvSpPr>
+            <a:spLocks noGrp="1"/>
+          </p:cNvSpPr>
+          <p:nvPr>
+            <p:ph type="body" idx="13"/>
+          </p:nvPr>
+        </p:nvSpPr>
+        <p:spPr>
+          <a:xfrm>
+            <a:off x="8066421" y="2499517"/>
+            <a:ext cx="2882475" cy="823912"/>
+          </a:xfrm>
+        </p:spPr>
+        <p:txBody>
+          <a:bodyPr vert="horz" lIns="91440" tIns="45720" rIns="91440" bIns="45720" rtlCol="0" anchor="b">
+            <a:normAutofit/>
+          </a:bodyPr>
+          <a:lstStyle/>
+          <a:p>
+            <a:r>
+              <a:rPr lang="en-ZA" dirty="0"/>
+              <a:t>Errors to check</a:t>
+            </a:r>
+          </a:p>
+        </p:txBody>
+      </p:sp>
+      <p:sp>
+        <p:nvSpPr>
+          <p:cNvPr id="8" name="Text Placeholder 7">
+            <a:extLst>
+              <a:ext uri="{FF2B5EF4-FFF2-40B4-BE49-F238E27FC236}">
+                <a16:creationId xmlns:a16="http://schemas.microsoft.com/office/drawing/2014/main" id="{E92B9716-8D44-4864-8986-720957B34362}"/>
+              </a:ext>
+            </a:extLst>
+          </p:cNvPr>
+          <p:cNvSpPr>
+            <a:spLocks noGrp="1"/>
+          </p:cNvSpPr>
+          <p:nvPr>
+            <p:ph sz="half" idx="14"/>
+          </p:nvPr>
+        </p:nvSpPr>
+        <p:spPr>
+          <a:xfrm>
+            <a:off x="8066420" y="3534570"/>
+            <a:ext cx="2882475" cy="1997867"/>
+          </a:xfrm>
+        </p:spPr>
+        <p:txBody>
+          <a:bodyPr/>
+          <a:lstStyle/>
+          <a:p>
+            <a:r>
+              <a:rPr lang="en-ZA" noProof="1"/>
+              <a:t>Bad keys, wrong birthday format</a:t>
+            </a:r>
+          </a:p>
+          <a:p>
+            <a:r>
+              <a:rPr lang="en-ZA" noProof="1"/>
+              <a:t>Database injection from UI</a:t>
+            </a:r>
+            <a:endParaRPr lang="en-ZA" dirty="0"/>
+          </a:p>
+          <a:p>
+            <a:endParaRPr lang="en-US" dirty="0"/>
+          </a:p>
+        </p:txBody>
+      </p:sp>
+      <p:sp>
+        <p:nvSpPr>
+          <p:cNvPr id="9" name="Date Placeholder 8">
+            <a:extLst>
+              <a:ext uri="{FF2B5EF4-FFF2-40B4-BE49-F238E27FC236}">
+                <a16:creationId xmlns:a16="http://schemas.microsoft.com/office/drawing/2014/main" id="{7B78F7A0-88C5-4940-B21C-099F472F39F9}"/>
+              </a:ext>
+            </a:extLst>
+          </p:cNvPr>
+          <p:cNvSpPr>
+            <a:spLocks noGrp="1"/>
+          </p:cNvSpPr>
+          <p:nvPr>
+            <p:ph type="dt" sz="half" idx="10"/>
+          </p:nvPr>
+        </p:nvSpPr>
+        <p:spPr>
+          <a:xfrm>
+            <a:off x="838200" y="6356350"/>
+            <a:ext cx="2743200" cy="365125"/>
+          </a:xfrm>
+        </p:spPr>
+        <p:txBody>
+          <a:bodyPr/>
+          <a:lstStyle/>
+          <a:p>
+            <a:r>
+              <a:rPr lang="en-US" dirty="0"/>
+              <a:t>2022</a:t>
+            </a:r>
+          </a:p>
+        </p:txBody>
+      </p:sp>
+      <p:sp>
+        <p:nvSpPr>
+          <p:cNvPr id="10" name="Footer Placeholder 9">
+            <a:extLst>
+              <a:ext uri="{FF2B5EF4-FFF2-40B4-BE49-F238E27FC236}">
+                <a16:creationId xmlns:a16="http://schemas.microsoft.com/office/drawing/2014/main" id="{D2186069-FC8E-433D-9BB4-942220CE8CFB}"/>
+              </a:ext>
+            </a:extLst>
+          </p:cNvPr>
+          <p:cNvSpPr>
+            <a:spLocks noGrp="1"/>
+          </p:cNvSpPr>
+          <p:nvPr>
+            <p:ph type="ftr" sz="quarter" idx="11"/>
+          </p:nvPr>
+        </p:nvSpPr>
+        <p:spPr>
+          <a:xfrm>
+            <a:off x="4038600" y="6356350"/>
+            <a:ext cx="4114800" cy="365125"/>
+          </a:xfrm>
+        </p:spPr>
+        <p:txBody>
+          <a:bodyPr/>
+          <a:lstStyle/>
+          <a:p>
+            <a:r>
+              <a:rPr lang="en-US" dirty="0"/>
+              <a:t>Maurice M. Materise</a:t>
+            </a:r>
+          </a:p>
+        </p:txBody>
+      </p:sp>
+      <p:sp>
+        <p:nvSpPr>
+          <p:cNvPr id="11" name="Slide Number Placeholder 10">
+            <a:extLst>
+              <a:ext uri="{FF2B5EF4-FFF2-40B4-BE49-F238E27FC236}">
+                <a16:creationId xmlns:a16="http://schemas.microsoft.com/office/drawing/2014/main" id="{BAD5B6F4-0A90-447A-A1AE-D75C934B6B29}"/>
+              </a:ext>
+            </a:extLst>
+          </p:cNvPr>
+          <p:cNvSpPr>
+            <a:spLocks noGrp="1"/>
+          </p:cNvSpPr>
+          <p:nvPr>
+            <p:ph type="sldNum" sz="quarter" idx="12"/>
+          </p:nvPr>
+        </p:nvSpPr>
+        <p:spPr>
+          <a:xfrm>
+            <a:off x="8610600" y="6356350"/>
+            <a:ext cx="2743200" cy="365125"/>
+          </a:xfrm>
+        </p:spPr>
+        <p:txBody>
+          <a:bodyPr/>
+          <a:lstStyle/>
+          <a:p>
+            <a:fld id="{B5CEABB6-07DC-46E8-9B57-56EC44A396E5}" type="slidenum">
+              <a:rPr lang="en-US" smtClean="0"/>
+              <a:pPr/>
+              <a:t>12</a:t>
+            </a:fld>
+            <a:endParaRPr lang="en-US" dirty="0"/>
+          </a:p>
+        </p:txBody>
+      </p:sp>
+    </p:spTree>
+    <p:extLst>
+      <p:ext uri="{BB962C8B-B14F-4D97-AF65-F5344CB8AC3E}">
+        <p14:creationId xmlns:p14="http://schemas.microsoft.com/office/powerpoint/2010/main" val="290857844"/>
+      </p:ext>
+    </p:extLst>
+  </p:cSld>
+  <p:clrMapOvr>
+    <a:masterClrMapping/>
+  </p:clrMapOvr>
+</p:sld>
+</file>
+
+<file path=ppt/slides/slide13.xml><?xml version="1.0" encoding="utf-8"?>
+<p:sld xmlns:a="http://schemas.openxmlformats.org/drawingml/2006/main" xmlns:r="http://schemas.openxmlformats.org/officeDocument/2006/relationships" xmlns:p="http://schemas.openxmlformats.org/presentationml/2006/main">
+  <p:cSld>
+    <p:spTree>
+      <p:nvGrpSpPr>
+        <p:cNvPr id="1" name=""/>
+        <p:cNvGrpSpPr/>
+        <p:nvPr/>
+      </p:nvGrpSpPr>
+      <p:grpSpPr>
+        <a:xfrm>
+          <a:off x="0" y="0"/>
+          <a:ext cx="0" cy="0"/>
+          <a:chOff x="0" y="0"/>
+          <a:chExt cx="0" cy="0"/>
+        </a:xfrm>
+      </p:grpSpPr>
+      <p:sp>
+        <p:nvSpPr>
+          <p:cNvPr id="2" name="Title 1">
+            <a:extLst>
+              <a:ext uri="{FF2B5EF4-FFF2-40B4-BE49-F238E27FC236}">
+                <a16:creationId xmlns:a16="http://schemas.microsoft.com/office/drawing/2014/main" id="{38FFA191-5CCC-43CB-BD83-4F80ED362608}"/>
+              </a:ext>
+            </a:extLst>
+          </p:cNvPr>
+          <p:cNvSpPr>
+            <a:spLocks noGrp="1"/>
+          </p:cNvSpPr>
+          <p:nvPr>
+            <p:ph type="title"/>
+          </p:nvPr>
+        </p:nvSpPr>
+        <p:spPr>
+          <a:xfrm>
+            <a:off x="5476875" y="1671639"/>
+            <a:ext cx="5111750" cy="1204912"/>
+          </a:xfrm>
+        </p:spPr>
+        <p:txBody>
+          <a:bodyPr/>
+          <a:lstStyle/>
+          <a:p>
+            <a:r>
+              <a:rPr lang="en-US" dirty="0"/>
+              <a:t>Questions</a:t>
+            </a:r>
+          </a:p>
+        </p:txBody>
+      </p:sp>
+      <p:sp>
+        <p:nvSpPr>
+          <p:cNvPr id="4" name="Date Placeholder 3">
+            <a:extLst>
+              <a:ext uri="{FF2B5EF4-FFF2-40B4-BE49-F238E27FC236}">
+                <a16:creationId xmlns:a16="http://schemas.microsoft.com/office/drawing/2014/main" id="{13F8C8B5-F6EC-489B-BD0F-CD89A73CAB3A}"/>
+              </a:ext>
+            </a:extLst>
+          </p:cNvPr>
+          <p:cNvSpPr>
+            <a:spLocks noGrp="1"/>
+          </p:cNvSpPr>
+          <p:nvPr>
+            <p:ph type="dt" sz="half" idx="10"/>
+          </p:nvPr>
+        </p:nvSpPr>
+        <p:spPr>
+          <a:xfrm>
+            <a:off x="838200" y="6356350"/>
+            <a:ext cx="2743200" cy="365125"/>
+          </a:xfrm>
+        </p:spPr>
+        <p:txBody>
+          <a:bodyPr/>
+          <a:lstStyle/>
+          <a:p>
+            <a:r>
+              <a:rPr lang="en-US" dirty="0"/>
+              <a:t>2022</a:t>
+            </a:r>
+          </a:p>
+        </p:txBody>
+      </p:sp>
+      <p:sp>
+        <p:nvSpPr>
+          <p:cNvPr id="5" name="Footer Placeholder 4">
+            <a:extLst>
+              <a:ext uri="{FF2B5EF4-FFF2-40B4-BE49-F238E27FC236}">
+                <a16:creationId xmlns:a16="http://schemas.microsoft.com/office/drawing/2014/main" id="{11AEA823-8519-4F9D-81FA-3673131076FC}"/>
+              </a:ext>
+            </a:extLst>
+          </p:cNvPr>
+          <p:cNvSpPr>
+            <a:spLocks noGrp="1"/>
+          </p:cNvSpPr>
+          <p:nvPr>
+            <p:ph type="ftr" sz="quarter" idx="11"/>
+          </p:nvPr>
+        </p:nvSpPr>
+        <p:spPr>
+          <a:xfrm>
+            <a:off x="4038600" y="6356350"/>
+            <a:ext cx="4114800" cy="365125"/>
+          </a:xfrm>
+        </p:spPr>
+        <p:txBody>
+          <a:bodyPr/>
+          <a:lstStyle/>
+          <a:p>
+            <a:r>
+              <a:rPr lang="en-US" dirty="0"/>
+              <a:t>Maurice M. Materise</a:t>
+            </a:r>
+          </a:p>
+        </p:txBody>
+      </p:sp>
+      <p:sp>
+        <p:nvSpPr>
+          <p:cNvPr id="6" name="Slide Number Placeholder 5">
+            <a:extLst>
+              <a:ext uri="{FF2B5EF4-FFF2-40B4-BE49-F238E27FC236}">
+                <a16:creationId xmlns:a16="http://schemas.microsoft.com/office/drawing/2014/main" id="{BAEFF51B-0E28-4171-AE7C-A31AAB42BC73}"/>
+              </a:ext>
+            </a:extLst>
+          </p:cNvPr>
+          <p:cNvSpPr>
+            <a:spLocks noGrp="1"/>
+          </p:cNvSpPr>
+          <p:nvPr>
+            <p:ph type="sldNum" sz="quarter" idx="12"/>
+          </p:nvPr>
+        </p:nvSpPr>
+        <p:spPr>
+          <a:xfrm>
+            <a:off x="8610600" y="6356350"/>
+            <a:ext cx="2743200" cy="365125"/>
+          </a:xfrm>
+        </p:spPr>
+        <p:txBody>
+          <a:bodyPr/>
+          <a:lstStyle/>
+          <a:p>
+            <a:fld id="{B5CEABB6-07DC-46E8-9B57-56EC44A396E5}" type="slidenum">
+              <a:rPr lang="en-US" smtClean="0"/>
+              <a:pPr/>
+              <a:t>13</a:t>
+            </a:fld>
+            <a:endParaRPr lang="en-US" dirty="0"/>
+          </a:p>
+        </p:txBody>
+      </p:sp>
+    </p:spTree>
+    <p:extLst>
+      <p:ext uri="{BB962C8B-B14F-4D97-AF65-F5344CB8AC3E}">
+        <p14:creationId xmlns:p14="http://schemas.microsoft.com/office/powerpoint/2010/main" val="2222089849"/>
+      </p:ext>
+    </p:extLst>
+  </p:cSld>
+  <p:clrMapOvr>
+    <a:masterClrMapping/>
+  </p:clrMapOvr>
+</p:sld>
+</file>
+
+<file path=ppt/slides/slide14.xml><?xml version="1.0" encoding="utf-8"?>
+<p:sld xmlns:a="http://schemas.openxmlformats.org/drawingml/2006/main" xmlns:r="http://schemas.openxmlformats.org/officeDocument/2006/relationships" xmlns:p="http://schemas.openxmlformats.org/presentationml/2006/main">
+  <p:cSld>
+    <p:spTree>
+      <p:nvGrpSpPr>
+        <p:cNvPr id="1" name=""/>
+        <p:cNvGrpSpPr/>
+        <p:nvPr/>
+      </p:nvGrpSpPr>
+      <p:grpSpPr>
+        <a:xfrm>
+          <a:off x="0" y="0"/>
+          <a:ext cx="0" cy="0"/>
+          <a:chOff x="0" y="0"/>
+          <a:chExt cx="0" cy="0"/>
+        </a:xfrm>
+      </p:grpSpPr>
+      <p:sp>
+        <p:nvSpPr>
+          <p:cNvPr id="2" name="Title 1">
+            <a:extLst>
+              <a:ext uri="{FF2B5EF4-FFF2-40B4-BE49-F238E27FC236}">
                 <a16:creationId xmlns:a16="http://schemas.microsoft.com/office/drawing/2014/main" id="{BCCAEE93-8585-46D4-A7EC-F184E317CB2E}"/>
               </a:ext>
             </a:extLst>
@@ -16744,8 +17085,8 @@
         </p:nvSpPr>
         <p:spPr>
           <a:xfrm>
-            <a:off x="4267200" y="3238103"/>
-            <a:ext cx="4179570" cy="2004161"/>
+            <a:off x="4267199" y="3238103"/>
+            <a:ext cx="7211627" cy="2967388"/>
           </a:xfrm>
         </p:spPr>
         <p:txBody>
@@ -16755,21 +17096,53 @@
           <a:lstStyle/>
           <a:p>
             <a:r>
-              <a:rPr lang="en-US" dirty="0"/>
+              <a:rPr lang="en-US" sz="1600" dirty="0"/>
               <a:t>Maurice M. Materise</a:t>
             </a:r>
           </a:p>
           <a:p>
             <a:r>
-              <a:rPr lang="en-US" dirty="0"/>
+              <a:rPr lang="en-US" sz="1600" dirty="0"/>
               <a:t>716-796-5849</a:t>
             </a:r>
           </a:p>
           <a:p>
             <a:r>
-              <a:rPr lang="en-US" dirty="0"/>
+              <a:rPr lang="en-US" sz="1600" dirty="0">
+                <a:hlinkClick r:id="rId2"/>
+              </a:rPr>
               <a:t>mmaterise@gmail.com</a:t>
             </a:r>
+            <a:endParaRPr lang="en-US" sz="1600" dirty="0"/>
+          </a:p>
+          <a:p>
+            <a:r>
+              <a:rPr lang="en-US" sz="1600" dirty="0"/>
+              <a:t>Full Code Base: </a:t>
+            </a:r>
+            <a:r>
+              <a:rPr lang="en-US" sz="1600" dirty="0">
+                <a:hlinkClick r:id="rId3"/>
+              </a:rPr>
+              <a:t>https://github.com/materimm/SAS</a:t>
+            </a:r>
+            <a:endParaRPr lang="en-US" sz="1600" dirty="0"/>
+          </a:p>
+          <a:p>
+            <a:r>
+              <a:rPr lang="en-US" sz="1600" dirty="0"/>
+              <a:t>LinkedIn: </a:t>
+            </a:r>
+            <a:r>
+              <a:rPr lang="en-US" sz="1600" dirty="0">
+                <a:hlinkClick r:id="rId4"/>
+              </a:rPr>
+              <a:t>https://www.linkedin.com/in/maurice-materise-72301575/</a:t>
+            </a:r>
+            <a:endParaRPr lang="en-US" sz="1600" dirty="0"/>
+          </a:p>
+          <a:p>
+            <a:endParaRPr lang="en-US" sz="1600" dirty="0"/>
           </a:p>
         </p:txBody>
       </p:sp>
@@ -16868,7 +17241,7 @@
             <a:fld id="{B5CEABB6-07DC-46E8-9B57-56EC44A396E5}" type="slidenum">
               <a:rPr lang="en-US" smtClean="0"/>
               <a:pPr/>
-              <a:t>12</a:t>
+              <a:t>14</a:t>
             </a:fld>
             <a:endParaRPr lang="en-US" dirty="0"/>
           </a:p>
@@ -16909,10 +17282,7 @@
           <p:cNvPr id="2" name="Title 1">
             <a:extLst>
               <a:ext uri="{FF2B5EF4-FFF2-40B4-BE49-F238E27FC236}">
-                <a16:creationId xmlns:a16="http://schemas.microsoft.com/office/drawing/2014/main" id="{6719F29B-F233-48AF-8261-F33A4E079E3E}"/>
-              </a:ext>
-              <a:ext uri="{C183D7F6-B498-43B3-948B-1728B52AA6E4}">
-                <adec:decorative xmlns:adec="http://schemas.microsoft.com/office/drawing/2017/decorative" val="0"/>
+                <a16:creationId xmlns:a16="http://schemas.microsoft.com/office/drawing/2014/main" id="{3CCF4AAF-8A17-4789-A1D9-79FA0377FDE6}"/>
               </a:ext>
             </a:extLst>
           </p:cNvPr>
@@ -16925,8 +17295,8 @@
         </p:nvSpPr>
         <p:spPr>
           <a:xfrm>
-            <a:off x="1333499" y="1020445"/>
-            <a:ext cx="3171825" cy="1325563"/>
+            <a:off x="1333499" y="643631"/>
+            <a:ext cx="3171825" cy="543841"/>
           </a:xfrm>
         </p:spPr>
         <p:txBody>
@@ -16934,21 +17304,18 @@
           <a:lstStyle/>
           <a:p>
             <a:r>
-              <a:rPr lang="en-ZA" dirty="0"/>
-              <a:t>Tools</a:t>
-            </a:r>
-          </a:p>
-        </p:txBody>
-      </p:sp>
-      <p:sp>
-        <p:nvSpPr>
-          <p:cNvPr id="3" name="Subtitle 2">
-            <a:extLst>
-              <a:ext uri="{FF2B5EF4-FFF2-40B4-BE49-F238E27FC236}">
-                <a16:creationId xmlns:a16="http://schemas.microsoft.com/office/drawing/2014/main" id="{35E3EA69-4E0E-41BD-8095-A124225A2647}"/>
-              </a:ext>
-              <a:ext uri="{C183D7F6-B498-43B3-948B-1728B52AA6E4}">
-                <adec:decorative xmlns:adec="http://schemas.microsoft.com/office/drawing/2017/decorative" val="0"/>
+              <a:rPr lang="en-US" dirty="0"/>
+              <a:t>Agenda</a:t>
+            </a:r>
+          </a:p>
+        </p:txBody>
+      </p:sp>
+      <p:sp>
+        <p:nvSpPr>
+          <p:cNvPr id="3" name="Content Placeholder 2">
+            <a:extLst>
+              <a:ext uri="{FF2B5EF4-FFF2-40B4-BE49-F238E27FC236}">
+                <a16:creationId xmlns:a16="http://schemas.microsoft.com/office/drawing/2014/main" id="{7417752D-DBB7-4B72-871F-42918164CBE3}"/>
               </a:ext>
             </a:extLst>
           </p:cNvPr>
@@ -16961,13 +17328,13 @@
         </p:nvSpPr>
         <p:spPr>
           <a:xfrm>
-            <a:off x="1333499" y="2924175"/>
-            <a:ext cx="3171825" cy="2519363"/>
+            <a:off x="1333499" y="1654668"/>
+            <a:ext cx="3171825" cy="4470924"/>
           </a:xfrm>
         </p:spPr>
         <p:txBody>
           <a:bodyPr>
-            <a:normAutofit/>
+            <a:normAutofit lnSpcReduction="10000"/>
           </a:bodyPr>
           <a:lstStyle/>
           <a:p>
@@ -16976,10 +17343,9 @@
               <a:buChar char="o"/>
             </a:pPr>
             <a:r>
-              <a:rPr lang="en-US" dirty="0" err="1"/>
-              <a:t>Github</a:t>
-            </a:r>
-            <a:endParaRPr lang="en-US" dirty="0"/>
+              <a:rPr lang="en-US" sz="1800" dirty="0"/>
+              <a:t>Prompt</a:t>
+            </a:r>
           </a:p>
           <a:p>
             <a:pPr marL="285750" indent="-285750">
@@ -16987,8 +17353,8 @@
               <a:buChar char="o"/>
             </a:pPr>
             <a:r>
-              <a:rPr lang="en-US" dirty="0"/>
-              <a:t>Python</a:t>
+              <a:rPr lang="en-US" sz="1800" dirty="0"/>
+              <a:t>Tools</a:t>
             </a:r>
           </a:p>
           <a:p>
@@ -16997,8 +17363,8 @@
               <a:buChar char="o"/>
             </a:pPr>
             <a:r>
-              <a:rPr lang="en-US" dirty="0"/>
-              <a:t>Flask</a:t>
+              <a:rPr lang="en-US" sz="1800" dirty="0"/>
+              <a:t>Initial Assumptions</a:t>
             </a:r>
           </a:p>
           <a:p>
@@ -17007,10 +17373,9 @@
               <a:buChar char="o"/>
             </a:pPr>
             <a:r>
-              <a:rPr lang="en-US" dirty="0" err="1"/>
-              <a:t>Javascript</a:t>
-            </a:r>
-            <a:endParaRPr lang="en-US" dirty="0"/>
+              <a:rPr lang="en-US" sz="1800" dirty="0"/>
+              <a:t>Solution</a:t>
+            </a:r>
           </a:p>
           <a:p>
             <a:pPr marL="285750" indent="-285750">
@@ -17018,10 +17383,9 @@
               <a:buChar char="o"/>
             </a:pPr>
             <a:r>
-              <a:rPr lang="en-US" dirty="0" err="1"/>
-              <a:t>JQuery</a:t>
-            </a:r>
-            <a:endParaRPr lang="en-US" dirty="0"/>
+              <a:rPr lang="en-US" sz="1800" dirty="0"/>
+              <a:t>Test Cases</a:t>
+            </a:r>
           </a:p>
           <a:p>
             <a:pPr marL="285750" indent="-285750">
@@ -17029,8 +17393,8 @@
               <a:buChar char="o"/>
             </a:pPr>
             <a:r>
-              <a:rPr lang="en-US" dirty="0"/>
-              <a:t>Bootstrap</a:t>
+              <a:rPr lang="en-US" sz="1800" dirty="0"/>
+              <a:t>Example Results</a:t>
             </a:r>
           </a:p>
           <a:p>
@@ -17038,16 +17402,63 @@
               <a:buFont typeface="Courier New" panose="02070309020205020404" pitchFamily="49" charset="0"/>
               <a:buChar char="o"/>
             </a:pPr>
-            <a:endParaRPr lang="en-US" dirty="0"/>
-          </a:p>
-        </p:txBody>
-      </p:sp>
-      <p:sp>
-        <p:nvSpPr>
-          <p:cNvPr id="6" name="Date Placeholder 5">
-            <a:extLst>
-              <a:ext uri="{FF2B5EF4-FFF2-40B4-BE49-F238E27FC236}">
-                <a16:creationId xmlns:a16="http://schemas.microsoft.com/office/drawing/2014/main" id="{B69DF042-37C5-4E09-AA4C-AA66649C9533}"/>
+            <a:r>
+              <a:rPr lang="en-US" sz="1800" dirty="0"/>
+              <a:t>User Interface</a:t>
+            </a:r>
+          </a:p>
+          <a:p>
+            <a:pPr marL="285750" indent="-285750">
+              <a:buFont typeface="Courier New" panose="02070309020205020404" pitchFamily="49" charset="0"/>
+              <a:buChar char="o"/>
+            </a:pPr>
+            <a:r>
+              <a:rPr lang="en-US" sz="1800" dirty="0"/>
+              <a:t>Challenges</a:t>
+            </a:r>
+          </a:p>
+          <a:p>
+            <a:pPr marL="285750" indent="-285750">
+              <a:buFont typeface="Courier New" panose="02070309020205020404" pitchFamily="49" charset="0"/>
+              <a:buChar char="o"/>
+            </a:pPr>
+            <a:r>
+              <a:rPr lang="en-US" sz="1800" dirty="0"/>
+              <a:t>Questions</a:t>
+            </a:r>
+          </a:p>
+          <a:p>
+            <a:pPr marL="285750" indent="-285750">
+              <a:buFont typeface="Courier New" panose="02070309020205020404" pitchFamily="49" charset="0"/>
+              <a:buChar char="o"/>
+            </a:pPr>
+            <a:r>
+              <a:rPr lang="en-US" sz="1800" dirty="0"/>
+              <a:t>Thanks</a:t>
+            </a:r>
+          </a:p>
+          <a:p>
+            <a:pPr marL="285750" indent="-285750">
+              <a:buFont typeface="Courier New" panose="02070309020205020404" pitchFamily="49" charset="0"/>
+              <a:buChar char="o"/>
+            </a:pPr>
+            <a:endParaRPr lang="en-US" sz="1800" dirty="0"/>
+          </a:p>
+          <a:p>
+            <a:pPr marL="285750" indent="-285750">
+              <a:buFont typeface="Courier New" panose="02070309020205020404" pitchFamily="49" charset="0"/>
+              <a:buChar char="o"/>
+            </a:pPr>
+            <a:endParaRPr lang="en-US" sz="1800" dirty="0"/>
+          </a:p>
+        </p:txBody>
+      </p:sp>
+      <p:sp>
+        <p:nvSpPr>
+          <p:cNvPr id="4" name="Date Placeholder 3">
+            <a:extLst>
+              <a:ext uri="{FF2B5EF4-FFF2-40B4-BE49-F238E27FC236}">
+                <a16:creationId xmlns:a16="http://schemas.microsoft.com/office/drawing/2014/main" id="{0B3A0EBD-CEAF-418E-A98D-A4FDC207DB71}"/>
               </a:ext>
             </a:extLst>
           </p:cNvPr>
@@ -17058,20 +17469,16 @@
             <p:ph type="dt" sz="half" idx="10"/>
           </p:nvPr>
         </p:nvSpPr>
-        <p:spPr>
-          <a:xfrm>
-            <a:off x="1333500" y="6356350"/>
-            <a:ext cx="985157" cy="365125"/>
-          </a:xfrm>
-        </p:spPr>
+        <p:spPr/>
         <p:txBody>
           <a:bodyPr/>
           <a:lstStyle/>
           <a:p>
             <a:r>
-              <a:rPr lang="en-US" dirty="0"/>
+              <a:rPr lang="en-US"/>
               <a:t>2022</a:t>
             </a:r>
+            <a:endParaRPr lang="en-US" dirty="0"/>
           </a:p>
         </p:txBody>
       </p:sp>
@@ -17080,7 +17487,7 @@
           <p:cNvPr id="5" name="Footer Placeholder 4">
             <a:extLst>
               <a:ext uri="{FF2B5EF4-FFF2-40B4-BE49-F238E27FC236}">
-                <a16:creationId xmlns:a16="http://schemas.microsoft.com/office/drawing/2014/main" id="{AF29EA23-F34E-486A-B8B2-0C3019266975}"/>
+                <a16:creationId xmlns:a16="http://schemas.microsoft.com/office/drawing/2014/main" id="{6B148BBF-E5E3-4C88-B286-8022D14B1B27}"/>
               </a:ext>
             </a:extLst>
           </p:cNvPr>
@@ -17091,29 +17498,25 @@
             <p:ph type="ftr" sz="quarter" idx="11"/>
           </p:nvPr>
         </p:nvSpPr>
-        <p:spPr>
-          <a:xfrm>
-            <a:off x="2669886" y="6356349"/>
-            <a:ext cx="2482842" cy="365125"/>
-          </a:xfrm>
-        </p:spPr>
+        <p:spPr/>
         <p:txBody>
           <a:bodyPr/>
           <a:lstStyle/>
           <a:p>
             <a:r>
-              <a:rPr lang="en-ZA" dirty="0"/>
+              <a:rPr lang="en-US"/>
               <a:t>Maurice M. Materise</a:t>
             </a:r>
-          </a:p>
-        </p:txBody>
-      </p:sp>
-      <p:sp>
-        <p:nvSpPr>
-          <p:cNvPr id="4" name="Slide Number Placeholder 3">
-            <a:extLst>
-              <a:ext uri="{FF2B5EF4-FFF2-40B4-BE49-F238E27FC236}">
-                <a16:creationId xmlns:a16="http://schemas.microsoft.com/office/drawing/2014/main" id="{328F602C-7F98-4C02-99D4-ED65E00D66A4}"/>
+            <a:endParaRPr lang="en-US" dirty="0"/>
+          </a:p>
+        </p:txBody>
+      </p:sp>
+      <p:sp>
+        <p:nvSpPr>
+          <p:cNvPr id="6" name="Slide Number Placeholder 5">
+            <a:extLst>
+              <a:ext uri="{FF2B5EF4-FFF2-40B4-BE49-F238E27FC236}">
+                <a16:creationId xmlns:a16="http://schemas.microsoft.com/office/drawing/2014/main" id="{81F88406-55C4-4097-937E-1F9514C06025}"/>
               </a:ext>
             </a:extLst>
           </p:cNvPr>
@@ -17124,29 +17527,23 @@
             <p:ph type="sldNum" sz="quarter" idx="12"/>
           </p:nvPr>
         </p:nvSpPr>
-        <p:spPr>
-          <a:xfrm>
-            <a:off x="5536305" y="6356350"/>
-            <a:ext cx="987552" cy="365125"/>
-          </a:xfrm>
-        </p:spPr>
+        <p:spPr/>
         <p:txBody>
           <a:bodyPr/>
           <a:lstStyle/>
           <a:p>
-            <a:fld id="{19B51A1E-902D-48AF-9020-955120F399B6}" type="slidenum">
-              <a:rPr lang="en-ZA" smtClean="0"/>
-              <a:pPr/>
+            <a:fld id="{B5CEABB6-07DC-46E8-9B57-56EC44A396E5}" type="slidenum">
+              <a:rPr lang="en-US" smtClean="0"/>
               <a:t>2</a:t>
             </a:fld>
-            <a:endParaRPr lang="en-ZA" dirty="0"/>
+            <a:endParaRPr lang="en-US" dirty="0"/>
           </a:p>
         </p:txBody>
       </p:sp>
     </p:spTree>
     <p:extLst>
       <p:ext uri="{BB962C8B-B14F-4D97-AF65-F5344CB8AC3E}">
-        <p14:creationId xmlns:p14="http://schemas.microsoft.com/office/powerpoint/2010/main" val="2243494996"/>
+        <p14:creationId xmlns:p14="http://schemas.microsoft.com/office/powerpoint/2010/main" val="101032382"/>
       </p:ext>
     </p:extLst>
   </p:cSld>
@@ -17178,7 +17575,7 @@
           <p:cNvPr id="2" name="Title 1">
             <a:extLst>
               <a:ext uri="{FF2B5EF4-FFF2-40B4-BE49-F238E27FC236}">
-                <a16:creationId xmlns:a16="http://schemas.microsoft.com/office/drawing/2014/main" id="{75031FE9-9059-4FE8-B4AC-9771F23A1B89}"/>
+                <a16:creationId xmlns:a16="http://schemas.microsoft.com/office/drawing/2014/main" id="{C08430A9-DC95-4C2E-A35E-5B916BED03A9}"/>
               </a:ext>
             </a:extLst>
           </p:cNvPr>
@@ -17191,8 +17588,8 @@
         </p:nvSpPr>
         <p:spPr>
           <a:xfrm>
-            <a:off x="1885156" y="892177"/>
-            <a:ext cx="8421688" cy="1325563"/>
+            <a:off x="4987246" y="355108"/>
+            <a:ext cx="5111750" cy="634461"/>
           </a:xfrm>
         </p:spPr>
         <p:txBody>
@@ -17201,326 +17598,295 @@
           <a:p>
             <a:r>
               <a:rPr lang="en-US" dirty="0"/>
-              <a:t>Initial Assumptions</a:t>
-            </a:r>
-          </a:p>
-        </p:txBody>
-      </p:sp>
-      <p:sp>
-        <p:nvSpPr>
-          <p:cNvPr id="3" name="Content Placeholder 2">
-            <a:extLst>
-              <a:ext uri="{FF2B5EF4-FFF2-40B4-BE49-F238E27FC236}">
-                <a16:creationId xmlns:a16="http://schemas.microsoft.com/office/drawing/2014/main" id="{D4A2EB3F-4D60-451F-8F45-7D6654D2FCD9}"/>
-              </a:ext>
-            </a:extLst>
-          </p:cNvPr>
-          <p:cNvSpPr>
-            <a:spLocks noGrp="1"/>
-          </p:cNvSpPr>
-          <p:nvPr>
-            <p:ph type="body" sz="quarter" idx="13"/>
-          </p:nvPr>
-        </p:nvSpPr>
-        <p:spPr>
-          <a:xfrm>
-            <a:off x="1485900" y="2563123"/>
-            <a:ext cx="4031945" cy="365125"/>
-          </a:xfrm>
-        </p:spPr>
-        <p:txBody>
-          <a:bodyPr vert="horz" lIns="91440" tIns="45720" rIns="91440" bIns="45720" rtlCol="0" anchor="t">
-            <a:normAutofit lnSpcReduction="10000"/>
-          </a:bodyPr>
-          <a:lstStyle/>
-          <a:p>
-            <a:r>
-              <a:rPr lang="en-US" dirty="0"/>
-              <a:t>Data Format</a:t>
-            </a:r>
-          </a:p>
-        </p:txBody>
-      </p:sp>
-      <p:sp>
-        <p:nvSpPr>
-          <p:cNvPr id="4" name="Text Placeholder 3">
-            <a:extLst>
-              <a:ext uri="{FF2B5EF4-FFF2-40B4-BE49-F238E27FC236}">
-                <a16:creationId xmlns:a16="http://schemas.microsoft.com/office/drawing/2014/main" id="{AC1C80FB-53F9-42EE-B1E6-D0F998EC5DFA}"/>
-              </a:ext>
-            </a:extLst>
-          </p:cNvPr>
-          <p:cNvSpPr>
-            <a:spLocks noGrp="1"/>
-          </p:cNvSpPr>
-          <p:nvPr>
-            <p:ph type="body" sz="quarter" idx="15"/>
-          </p:nvPr>
-        </p:nvSpPr>
-        <p:spPr>
-          <a:xfrm>
-            <a:off x="1485664" y="3070348"/>
-            <a:ext cx="4031030" cy="1057308"/>
-          </a:xfrm>
-        </p:spPr>
+              <a:t>Prompt</a:t>
+            </a:r>
+          </a:p>
+        </p:txBody>
+      </p:sp>
+      <p:sp>
+        <p:nvSpPr>
+          <p:cNvPr id="4" name="Date Placeholder 3">
+            <a:extLst>
+              <a:ext uri="{FF2B5EF4-FFF2-40B4-BE49-F238E27FC236}">
+                <a16:creationId xmlns:a16="http://schemas.microsoft.com/office/drawing/2014/main" id="{11834FF8-8017-4A7D-90FA-F3B78626C6D4}"/>
+              </a:ext>
+            </a:extLst>
+          </p:cNvPr>
+          <p:cNvSpPr>
+            <a:spLocks noGrp="1"/>
+          </p:cNvSpPr>
+          <p:nvPr>
+            <p:ph type="dt" sz="half" idx="10"/>
+          </p:nvPr>
+        </p:nvSpPr>
+        <p:spPr/>
         <p:txBody>
           <a:bodyPr/>
           <a:lstStyle/>
           <a:p>
             <a:r>
               <a:rPr lang="en-US" dirty="0"/>
-              <a:t>I used a JSON format with key value pairs for employee details.</a:t>
-            </a:r>
-          </a:p>
-        </p:txBody>
-      </p:sp>
-      <p:sp>
-        <p:nvSpPr>
-          <p:cNvPr id="5" name="Text Placeholder 4">
-            <a:extLst>
-              <a:ext uri="{FF2B5EF4-FFF2-40B4-BE49-F238E27FC236}">
-                <a16:creationId xmlns:a16="http://schemas.microsoft.com/office/drawing/2014/main" id="{E81BA2B5-6A90-4204-ABDD-7183FBB03A02}"/>
-              </a:ext>
-            </a:extLst>
-          </p:cNvPr>
-          <p:cNvSpPr>
-            <a:spLocks noGrp="1"/>
-          </p:cNvSpPr>
-          <p:nvPr>
-            <p:ph type="body" sz="quarter" idx="16"/>
-          </p:nvPr>
-        </p:nvSpPr>
-        <p:spPr>
-          <a:xfrm>
-            <a:off x="6673004" y="2563123"/>
-            <a:ext cx="4031945" cy="365125"/>
-          </a:xfrm>
-        </p:spPr>
-        <p:txBody>
-          <a:bodyPr>
-            <a:normAutofit lnSpcReduction="10000"/>
-          </a:bodyPr>
-          <a:lstStyle/>
-          <a:p>
-            <a:r>
-              <a:rPr lang="en-US" dirty="0"/>
-              <a:t>Use Case</a:t>
-            </a:r>
-          </a:p>
-        </p:txBody>
-      </p:sp>
-      <p:sp>
-        <p:nvSpPr>
-          <p:cNvPr id="6" name="Text Placeholder 5">
-            <a:extLst>
-              <a:ext uri="{FF2B5EF4-FFF2-40B4-BE49-F238E27FC236}">
-                <a16:creationId xmlns:a16="http://schemas.microsoft.com/office/drawing/2014/main" id="{7E7D4C34-22A0-4D54-A07D-E1E9A11463E5}"/>
-              </a:ext>
-            </a:extLst>
-          </p:cNvPr>
-          <p:cNvSpPr>
-            <a:spLocks noGrp="1"/>
-          </p:cNvSpPr>
-          <p:nvPr>
-            <p:ph type="body" sz="quarter" idx="17"/>
-          </p:nvPr>
-        </p:nvSpPr>
-        <p:spPr>
-          <a:xfrm>
-            <a:off x="6673143" y="3070348"/>
-            <a:ext cx="4031030" cy="1057308"/>
-          </a:xfrm>
-        </p:spPr>
+              <a:t>2022</a:t>
+            </a:r>
+          </a:p>
+        </p:txBody>
+      </p:sp>
+      <p:sp>
+        <p:nvSpPr>
+          <p:cNvPr id="5" name="Footer Placeholder 4">
+            <a:extLst>
+              <a:ext uri="{FF2B5EF4-FFF2-40B4-BE49-F238E27FC236}">
+                <a16:creationId xmlns:a16="http://schemas.microsoft.com/office/drawing/2014/main" id="{47937E5B-465E-4F29-8E25-6FF11094FF97}"/>
+              </a:ext>
+            </a:extLst>
+          </p:cNvPr>
+          <p:cNvSpPr>
+            <a:spLocks noGrp="1"/>
+          </p:cNvSpPr>
+          <p:nvPr>
+            <p:ph type="ftr" sz="quarter" idx="11"/>
+          </p:nvPr>
+        </p:nvSpPr>
+        <p:spPr/>
         <p:txBody>
           <a:bodyPr/>
           <a:lstStyle/>
           <a:p>
             <a:r>
               <a:rPr lang="en-US" dirty="0"/>
-              <a:t>The object is simply to view which employees have birthdays in a select month. HR would want results in a UI, not from a command line result. </a:t>
-            </a:r>
-          </a:p>
-          <a:p>
-            <a:endParaRPr lang="en-US" dirty="0"/>
-          </a:p>
-        </p:txBody>
-      </p:sp>
-      <p:sp>
-        <p:nvSpPr>
-          <p:cNvPr id="7" name="Text Placeholder 6">
-            <a:extLst>
-              <a:ext uri="{FF2B5EF4-FFF2-40B4-BE49-F238E27FC236}">
-                <a16:creationId xmlns:a16="http://schemas.microsoft.com/office/drawing/2014/main" id="{301D392D-FB66-47A0-B628-5ADE822A2CFF}"/>
-              </a:ext>
-            </a:extLst>
-          </p:cNvPr>
-          <p:cNvSpPr>
-            <a:spLocks noGrp="1"/>
-          </p:cNvSpPr>
-          <p:nvPr>
-            <p:ph type="body" sz="quarter" idx="18"/>
-          </p:nvPr>
-        </p:nvSpPr>
-        <p:spPr>
-          <a:xfrm>
-            <a:off x="4038087" y="4459736"/>
-            <a:ext cx="4031945" cy="365125"/>
-          </a:xfrm>
-        </p:spPr>
-        <p:txBody>
-          <a:bodyPr>
-            <a:normAutofit lnSpcReduction="10000"/>
-          </a:bodyPr>
-          <a:lstStyle/>
-          <a:p>
-            <a:r>
-              <a:rPr lang="en-US" dirty="0"/>
-              <a:t>Data is Valid</a:t>
-            </a:r>
-          </a:p>
-        </p:txBody>
-      </p:sp>
-      <p:sp>
-        <p:nvSpPr>
-          <p:cNvPr id="8" name="Text Placeholder 7">
-            <a:extLst>
-              <a:ext uri="{FF2B5EF4-FFF2-40B4-BE49-F238E27FC236}">
-                <a16:creationId xmlns:a16="http://schemas.microsoft.com/office/drawing/2014/main" id="{51C26CE0-2506-4B44-A26F-C12BFA5B18B5}"/>
-              </a:ext>
-            </a:extLst>
-          </p:cNvPr>
-          <p:cNvSpPr>
-            <a:spLocks noGrp="1"/>
-          </p:cNvSpPr>
-          <p:nvPr>
-            <p:ph type="body" sz="quarter" idx="19"/>
-          </p:nvPr>
-        </p:nvSpPr>
-        <p:spPr>
-          <a:xfrm>
-            <a:off x="4038600" y="4966961"/>
-            <a:ext cx="4031030" cy="1057308"/>
-          </a:xfrm>
-        </p:spPr>
+              <a:t>Maurice M. Materise</a:t>
+            </a:r>
+          </a:p>
+        </p:txBody>
+      </p:sp>
+      <p:sp>
+        <p:nvSpPr>
+          <p:cNvPr id="6" name="Slide Number Placeholder 5">
+            <a:extLst>
+              <a:ext uri="{FF2B5EF4-FFF2-40B4-BE49-F238E27FC236}">
+                <a16:creationId xmlns:a16="http://schemas.microsoft.com/office/drawing/2014/main" id="{58E306C7-8000-4F4D-ADDE-80F1776432EF}"/>
+              </a:ext>
+            </a:extLst>
+          </p:cNvPr>
+          <p:cNvSpPr>
+            <a:spLocks noGrp="1"/>
+          </p:cNvSpPr>
+          <p:nvPr>
+            <p:ph type="sldNum" sz="quarter" idx="12"/>
+          </p:nvPr>
+        </p:nvSpPr>
+        <p:spPr/>
         <p:txBody>
           <a:bodyPr/>
           <a:lstStyle/>
           <a:p>
-            <a:r>
-              <a:rPr lang="en-US" dirty="0"/>
-              <a:t>I did not include error checks on the data received. I would expect the error checking to occur on data input. </a:t>
-            </a:r>
-          </a:p>
-          <a:p>
-            <a:endParaRPr lang="en-US" dirty="0"/>
-          </a:p>
-        </p:txBody>
-      </p:sp>
-      <p:sp>
-        <p:nvSpPr>
-          <p:cNvPr id="80" name="Date Placeholder 79">
-            <a:extLst>
-              <a:ext uri="{FF2B5EF4-FFF2-40B4-BE49-F238E27FC236}">
-                <a16:creationId xmlns:a16="http://schemas.microsoft.com/office/drawing/2014/main" id="{BC1F9D86-85D8-4FD0-B0D3-47D778722782}"/>
-              </a:ext>
-            </a:extLst>
-          </p:cNvPr>
-          <p:cNvSpPr>
-            <a:spLocks noGrp="1"/>
-          </p:cNvSpPr>
-          <p:nvPr>
-            <p:ph type="dt" sz="half" idx="20"/>
-          </p:nvPr>
-        </p:nvSpPr>
-        <p:spPr>
-          <a:xfrm>
-            <a:off x="838200" y="6356350"/>
-            <a:ext cx="2743200" cy="365125"/>
-          </a:xfrm>
-        </p:spPr>
-        <p:txBody>
-          <a:bodyPr/>
-          <a:lstStyle/>
-          <a:p>
-            <a:r>
-              <a:rPr lang="en-US" dirty="0"/>
-              <a:t>2022</a:t>
-            </a:r>
-          </a:p>
-        </p:txBody>
-      </p:sp>
-      <p:sp>
-        <p:nvSpPr>
-          <p:cNvPr id="81" name="Footer Placeholder 80">
-            <a:extLst>
-              <a:ext uri="{FF2B5EF4-FFF2-40B4-BE49-F238E27FC236}">
-                <a16:creationId xmlns:a16="http://schemas.microsoft.com/office/drawing/2014/main" id="{E94F1D24-E4A1-4B59-B57E-A28453963B88}"/>
-              </a:ext>
-            </a:extLst>
-          </p:cNvPr>
-          <p:cNvSpPr>
-            <a:spLocks noGrp="1"/>
-          </p:cNvSpPr>
-          <p:nvPr>
-            <p:ph type="ftr" sz="quarter" idx="21"/>
-          </p:nvPr>
-        </p:nvSpPr>
-        <p:spPr>
-          <a:xfrm>
-            <a:off x="4038600" y="6356350"/>
-            <a:ext cx="4114800" cy="365125"/>
-          </a:xfrm>
-        </p:spPr>
-        <p:txBody>
-          <a:bodyPr/>
-          <a:lstStyle/>
-          <a:p>
-            <a:r>
-              <a:rPr lang="en-US" dirty="0"/>
-              <a:t>Maurice M. Materise</a:t>
-            </a:r>
-          </a:p>
-        </p:txBody>
-      </p:sp>
-      <p:sp>
-        <p:nvSpPr>
-          <p:cNvPr id="82" name="Slide Number Placeholder 81">
-            <a:extLst>
-              <a:ext uri="{FF2B5EF4-FFF2-40B4-BE49-F238E27FC236}">
-                <a16:creationId xmlns:a16="http://schemas.microsoft.com/office/drawing/2014/main" id="{CE36A058-BEC2-4BC5-A467-F2EB2A365051}"/>
-              </a:ext>
-            </a:extLst>
-          </p:cNvPr>
-          <p:cNvSpPr>
-            <a:spLocks noGrp="1"/>
-          </p:cNvSpPr>
-          <p:nvPr>
-            <p:ph type="sldNum" sz="quarter" idx="22"/>
-          </p:nvPr>
-        </p:nvSpPr>
-        <p:spPr>
-          <a:xfrm>
-            <a:off x="8610600" y="6356350"/>
-            <a:ext cx="2743200" cy="365125"/>
-          </a:xfrm>
-        </p:spPr>
-        <p:txBody>
-          <a:bodyPr/>
-          <a:lstStyle/>
-          <a:p>
             <a:fld id="{B5CEABB6-07DC-46E8-9B57-56EC44A396E5}" type="slidenum">
               <a:rPr lang="en-US" smtClean="0"/>
-              <a:pPr/>
               <a:t>3</a:t>
             </a:fld>
             <a:endParaRPr lang="en-US" dirty="0"/>
           </a:p>
         </p:txBody>
       </p:sp>
+      <p:sp>
+        <p:nvSpPr>
+          <p:cNvPr id="3" name="TextBox 2">
+            <a:extLst>
+              <a:ext uri="{FF2B5EF4-FFF2-40B4-BE49-F238E27FC236}">
+                <a16:creationId xmlns:a16="http://schemas.microsoft.com/office/drawing/2014/main" id="{971AF582-D242-4ED0-8235-E0DC7B074F1E}"/>
+              </a:ext>
+            </a:extLst>
+          </p:cNvPr>
+          <p:cNvSpPr txBox="1"/>
+          <p:nvPr/>
+        </p:nvSpPr>
+        <p:spPr>
+          <a:xfrm>
+            <a:off x="4987246" y="1289953"/>
+            <a:ext cx="6332307" cy="4278094"/>
+          </a:xfrm>
+          <a:prstGeom prst="rect">
+            <a:avLst/>
+          </a:prstGeom>
+          <a:noFill/>
+        </p:spPr>
+        <p:txBody>
+          <a:bodyPr wrap="square" rtlCol="0">
+            <a:spAutoFit/>
+          </a:bodyPr>
+          <a:lstStyle/>
+          <a:p>
+            <a:r>
+              <a:rPr lang="en-US" sz="1600" b="0" i="0" dirty="0">
+                <a:solidFill>
+                  <a:srgbClr val="333333"/>
+                </a:solidFill>
+                <a:effectLst/>
+                <a:latin typeface="Roboto" panose="020B0604020202020204" pitchFamily="2" charset="0"/>
+              </a:rPr>
+              <a:t>A customer is asking for a script / program they can give out to their HR department to help speed up business operations. You have been given the following acceptance criteria:</a:t>
+            </a:r>
+          </a:p>
+          <a:p>
+            <a:pPr marL="285750" indent="-285750">
+              <a:buFont typeface="Courier New" panose="02070309020205020404" pitchFamily="49" charset="0"/>
+              <a:buChar char="o"/>
+            </a:pPr>
+            <a:r>
+              <a:rPr lang="en-US" sz="1600" b="0" i="0" dirty="0">
+                <a:solidFill>
+                  <a:srgbClr val="333333"/>
+                </a:solidFill>
+                <a:effectLst/>
+                <a:latin typeface="Roboto" panose="02000000000000000000" pitchFamily="2" charset="0"/>
+              </a:rPr>
+              <a:t>Given I have an array of employee records that include their birthday</a:t>
+            </a:r>
+          </a:p>
+          <a:p>
+            <a:pPr marL="285750" indent="-285750">
+              <a:buFont typeface="Courier New" panose="02070309020205020404" pitchFamily="49" charset="0"/>
+              <a:buChar char="o"/>
+            </a:pPr>
+            <a:r>
+              <a:rPr lang="en-US" sz="1600" b="0" i="0" dirty="0">
+                <a:solidFill>
+                  <a:srgbClr val="333333"/>
+                </a:solidFill>
+                <a:effectLst/>
+                <a:latin typeface="Roboto" panose="02000000000000000000" pitchFamily="2" charset="0"/>
+              </a:rPr>
+              <a:t>When I execute this script/program with the array of employees</a:t>
+            </a:r>
+          </a:p>
+          <a:p>
+            <a:pPr marL="285750" indent="-285750">
+              <a:buFont typeface="Courier New" panose="02070309020205020404" pitchFamily="49" charset="0"/>
+              <a:buChar char="o"/>
+            </a:pPr>
+            <a:r>
+              <a:rPr lang="en-US" sz="1600" b="0" i="0" dirty="0">
+                <a:solidFill>
+                  <a:srgbClr val="333333"/>
+                </a:solidFill>
+                <a:effectLst/>
+                <a:latin typeface="Roboto" panose="02000000000000000000" pitchFamily="2" charset="0"/>
+              </a:rPr>
+              <a:t>Then I am returned an array of employees who's birthday is in the current month</a:t>
+            </a:r>
+          </a:p>
+          <a:p>
+            <a:endParaRPr lang="en-US" sz="1600" b="0" i="0" dirty="0">
+              <a:solidFill>
+                <a:srgbClr val="333333"/>
+              </a:solidFill>
+              <a:effectLst/>
+              <a:latin typeface="Roboto" panose="02000000000000000000" pitchFamily="2" charset="0"/>
+            </a:endParaRPr>
+          </a:p>
+          <a:p>
+            <a:endParaRPr lang="en-US" sz="1600" b="0" i="0" dirty="0">
+              <a:solidFill>
+                <a:srgbClr val="333333"/>
+              </a:solidFill>
+              <a:effectLst/>
+              <a:latin typeface="Roboto" panose="020B0604020202020204" pitchFamily="2" charset="0"/>
+            </a:endParaRPr>
+          </a:p>
+          <a:p>
+            <a:r>
+              <a:rPr lang="en-US" sz="1600" dirty="0">
+                <a:solidFill>
+                  <a:srgbClr val="333333"/>
+                </a:solidFill>
+                <a:latin typeface="Roboto" panose="020B0604020202020204" pitchFamily="2" charset="0"/>
+              </a:rPr>
+              <a:t>Guidelines:</a:t>
+            </a:r>
+          </a:p>
+          <a:p>
+            <a:pPr marL="285750" indent="-285750">
+              <a:buFont typeface="Courier New" panose="02070309020205020404" pitchFamily="49" charset="0"/>
+              <a:buChar char="o"/>
+            </a:pPr>
+            <a:r>
+              <a:rPr lang="en-US" sz="1600" b="0" i="0" dirty="0">
+                <a:solidFill>
+                  <a:srgbClr val="333333"/>
+                </a:solidFill>
+                <a:effectLst/>
+                <a:latin typeface="Roboto" panose="02000000000000000000" pitchFamily="2" charset="0"/>
+              </a:rPr>
+              <a:t>Build a runnable script/program that meets the above acceptance criteria</a:t>
+            </a:r>
+          </a:p>
+          <a:p>
+            <a:pPr marL="285750" indent="-285750">
+              <a:buFont typeface="Courier New" panose="02070309020205020404" pitchFamily="49" charset="0"/>
+              <a:buChar char="o"/>
+            </a:pPr>
+            <a:r>
+              <a:rPr lang="en-US" sz="1600" b="0" i="0" dirty="0">
+                <a:solidFill>
+                  <a:srgbClr val="333333"/>
+                </a:solidFill>
+                <a:effectLst/>
+                <a:latin typeface="Roboto" panose="02000000000000000000" pitchFamily="2" charset="0"/>
+              </a:rPr>
+              <a:t>Use the language and development tools of your choice</a:t>
+            </a:r>
+          </a:p>
+          <a:p>
+            <a:pPr marL="285750" indent="-285750">
+              <a:buFont typeface="Courier New" panose="02070309020205020404" pitchFamily="49" charset="0"/>
+              <a:buChar char="o"/>
+            </a:pPr>
+            <a:r>
+              <a:rPr lang="en-US" sz="1600" b="0" i="0" dirty="0">
+                <a:solidFill>
+                  <a:srgbClr val="333333"/>
+                </a:solidFill>
+                <a:effectLst/>
+                <a:latin typeface="Roboto" panose="02000000000000000000" pitchFamily="2" charset="0"/>
+              </a:rPr>
+              <a:t>The interface with this script or program is up to you</a:t>
+            </a:r>
+          </a:p>
+          <a:p>
+            <a:pPr marL="285750" indent="-285750">
+              <a:buFont typeface="Courier New" panose="02070309020205020404" pitchFamily="49" charset="0"/>
+              <a:buChar char="o"/>
+            </a:pPr>
+            <a:r>
+              <a:rPr lang="en-US" sz="1600" b="0" i="0" dirty="0">
+                <a:solidFill>
+                  <a:srgbClr val="333333"/>
+                </a:solidFill>
+                <a:effectLst/>
+                <a:latin typeface="Roboto" panose="02000000000000000000" pitchFamily="2" charset="0"/>
+              </a:rPr>
+              <a:t>Should be tested</a:t>
+            </a:r>
+          </a:p>
+          <a:p>
+            <a:pPr marL="285750" indent="-285750">
+              <a:buFont typeface="Courier New" panose="02070309020205020404" pitchFamily="49" charset="0"/>
+              <a:buChar char="o"/>
+            </a:pPr>
+            <a:endParaRPr lang="en-US" sz="1600" b="0" i="0" dirty="0">
+              <a:solidFill>
+                <a:srgbClr val="333333"/>
+              </a:solidFill>
+              <a:effectLst/>
+              <a:latin typeface="Roboto" panose="020B0604020202020204" pitchFamily="2" charset="0"/>
+            </a:endParaRPr>
+          </a:p>
+        </p:txBody>
+      </p:sp>
     </p:spTree>
     <p:extLst>
       <p:ext uri="{BB962C8B-B14F-4D97-AF65-F5344CB8AC3E}">
-        <p14:creationId xmlns:p14="http://schemas.microsoft.com/office/powerpoint/2010/main" val="1593920805"/>
+        <p14:creationId xmlns:p14="http://schemas.microsoft.com/office/powerpoint/2010/main" val="3802889899"/>
       </p:ext>
     </p:extLst>
   </p:cSld>
@@ -17552,7 +17918,10 @@
           <p:cNvPr id="2" name="Title 1">
             <a:extLst>
               <a:ext uri="{FF2B5EF4-FFF2-40B4-BE49-F238E27FC236}">
-                <a16:creationId xmlns:a16="http://schemas.microsoft.com/office/drawing/2014/main" id="{C08430A9-DC95-4C2E-A35E-5B916BED03A9}"/>
+                <a16:creationId xmlns:a16="http://schemas.microsoft.com/office/drawing/2014/main" id="{6719F29B-F233-48AF-8261-F33A4E079E3E}"/>
+              </a:ext>
+              <a:ext uri="{C183D7F6-B498-43B3-948B-1728B52AA6E4}">
+                <adec:decorative xmlns:adec="http://schemas.microsoft.com/office/drawing/2017/decorative" val="0"/>
               </a:ext>
             </a:extLst>
           </p:cNvPr>
@@ -17565,8 +17934,8 @@
         </p:nvSpPr>
         <p:spPr>
           <a:xfrm>
-            <a:off x="3245841" y="0"/>
-            <a:ext cx="5111750" cy="634461"/>
+            <a:off x="1333499" y="727969"/>
+            <a:ext cx="3171825" cy="605985"/>
           </a:xfrm>
         </p:spPr>
         <p:txBody>
@@ -17574,18 +17943,120 @@
           <a:lstStyle/>
           <a:p>
             <a:r>
-              <a:rPr lang="en-US" dirty="0"/>
-              <a:t>Solution</a:t>
-            </a:r>
-          </a:p>
-        </p:txBody>
-      </p:sp>
-      <p:sp>
-        <p:nvSpPr>
-          <p:cNvPr id="4" name="Date Placeholder 3">
-            <a:extLst>
-              <a:ext uri="{FF2B5EF4-FFF2-40B4-BE49-F238E27FC236}">
-                <a16:creationId xmlns:a16="http://schemas.microsoft.com/office/drawing/2014/main" id="{11834FF8-8017-4A7D-90FA-F3B78626C6D4}"/>
+              <a:rPr lang="en-ZA" dirty="0"/>
+              <a:t>Tools</a:t>
+            </a:r>
+          </a:p>
+        </p:txBody>
+      </p:sp>
+      <p:sp>
+        <p:nvSpPr>
+          <p:cNvPr id="3" name="Subtitle 2">
+            <a:extLst>
+              <a:ext uri="{FF2B5EF4-FFF2-40B4-BE49-F238E27FC236}">
+                <a16:creationId xmlns:a16="http://schemas.microsoft.com/office/drawing/2014/main" id="{35E3EA69-4E0E-41BD-8095-A124225A2647}"/>
+              </a:ext>
+              <a:ext uri="{C183D7F6-B498-43B3-948B-1728B52AA6E4}">
+                <adec:decorative xmlns:adec="http://schemas.microsoft.com/office/drawing/2017/decorative" val="0"/>
+              </a:ext>
+            </a:extLst>
+          </p:cNvPr>
+          <p:cNvSpPr>
+            <a:spLocks noGrp="1"/>
+          </p:cNvSpPr>
+          <p:nvPr>
+            <p:ph idx="1"/>
+          </p:nvPr>
+        </p:nvSpPr>
+        <p:spPr>
+          <a:xfrm>
+            <a:off x="1333499" y="1823344"/>
+            <a:ext cx="3171825" cy="4062551"/>
+          </a:xfrm>
+        </p:spPr>
+        <p:txBody>
+          <a:bodyPr>
+            <a:normAutofit/>
+          </a:bodyPr>
+          <a:lstStyle/>
+          <a:p>
+            <a:pPr marL="285750" indent="-285750">
+              <a:buFont typeface="Courier New" panose="02070309020205020404" pitchFamily="49" charset="0"/>
+              <a:buChar char="o"/>
+            </a:pPr>
+            <a:r>
+              <a:rPr lang="en-US" sz="1800" dirty="0" err="1"/>
+              <a:t>Github</a:t>
+            </a:r>
+            <a:endParaRPr lang="en-US" sz="1800" dirty="0"/>
+          </a:p>
+          <a:p>
+            <a:pPr marL="285750" indent="-285750">
+              <a:buFont typeface="Courier New" panose="02070309020205020404" pitchFamily="49" charset="0"/>
+              <a:buChar char="o"/>
+            </a:pPr>
+            <a:r>
+              <a:rPr lang="en-US" sz="1800" dirty="0"/>
+              <a:t>Python</a:t>
+            </a:r>
+          </a:p>
+          <a:p>
+            <a:pPr marL="285750" indent="-285750">
+              <a:buFont typeface="Courier New" panose="02070309020205020404" pitchFamily="49" charset="0"/>
+              <a:buChar char="o"/>
+            </a:pPr>
+            <a:r>
+              <a:rPr lang="en-US" sz="1800" dirty="0"/>
+              <a:t>Flask</a:t>
+            </a:r>
+          </a:p>
+          <a:p>
+            <a:pPr marL="285750" indent="-285750">
+              <a:buFont typeface="Courier New" panose="02070309020205020404" pitchFamily="49" charset="0"/>
+              <a:buChar char="o"/>
+            </a:pPr>
+            <a:r>
+              <a:rPr lang="en-US" sz="1800" dirty="0" err="1"/>
+              <a:t>Javascript</a:t>
+            </a:r>
+            <a:endParaRPr lang="en-US" sz="1800" dirty="0"/>
+          </a:p>
+          <a:p>
+            <a:pPr marL="285750" indent="-285750">
+              <a:buFont typeface="Courier New" panose="02070309020205020404" pitchFamily="49" charset="0"/>
+              <a:buChar char="o"/>
+            </a:pPr>
+            <a:r>
+              <a:rPr lang="en-US" sz="1800" dirty="0" err="1"/>
+              <a:t>JQuery</a:t>
+            </a:r>
+            <a:endParaRPr lang="en-US" sz="1800" dirty="0"/>
+          </a:p>
+          <a:p>
+            <a:pPr marL="285750" indent="-285750">
+              <a:buFont typeface="Courier New" panose="02070309020205020404" pitchFamily="49" charset="0"/>
+              <a:buChar char="o"/>
+            </a:pPr>
+            <a:r>
+              <a:rPr lang="en-US" sz="1800" dirty="0"/>
+              <a:t>Bootstrap</a:t>
+            </a:r>
+          </a:p>
+          <a:p>
+            <a:pPr marL="285750" indent="-285750">
+              <a:buFont typeface="Courier New" panose="02070309020205020404" pitchFamily="49" charset="0"/>
+              <a:buChar char="o"/>
+            </a:pPr>
+            <a:endParaRPr lang="en-US" sz="1800" dirty="0"/>
+          </a:p>
+        </p:txBody>
+      </p:sp>
+      <p:sp>
+        <p:nvSpPr>
+          <p:cNvPr id="6" name="Date Placeholder 5">
+            <a:extLst>
+              <a:ext uri="{FF2B5EF4-FFF2-40B4-BE49-F238E27FC236}">
+                <a16:creationId xmlns:a16="http://schemas.microsoft.com/office/drawing/2014/main" id="{B69DF042-37C5-4E09-AA4C-AA66649C9533}"/>
               </a:ext>
             </a:extLst>
           </p:cNvPr>
@@ -17596,7 +18067,12 @@
             <p:ph type="dt" sz="half" idx="10"/>
           </p:nvPr>
         </p:nvSpPr>
-        <p:spPr/>
+        <p:spPr>
+          <a:xfrm>
+            <a:off x="1333500" y="6356350"/>
+            <a:ext cx="985157" cy="365125"/>
+          </a:xfrm>
+        </p:spPr>
         <p:txBody>
           <a:bodyPr/>
           <a:lstStyle/>
@@ -17613,7 +18089,7 @@
           <p:cNvPr id="5" name="Footer Placeholder 4">
             <a:extLst>
               <a:ext uri="{FF2B5EF4-FFF2-40B4-BE49-F238E27FC236}">
-                <a16:creationId xmlns:a16="http://schemas.microsoft.com/office/drawing/2014/main" id="{47937E5B-465E-4F29-8E25-6FF11094FF97}"/>
+                <a16:creationId xmlns:a16="http://schemas.microsoft.com/office/drawing/2014/main" id="{AF29EA23-F34E-486A-B8B2-0C3019266975}"/>
               </a:ext>
             </a:extLst>
           </p:cNvPr>
@@ -17624,13 +18100,18 @@
             <p:ph type="ftr" sz="quarter" idx="11"/>
           </p:nvPr>
         </p:nvSpPr>
-        <p:spPr/>
+        <p:spPr>
+          <a:xfrm>
+            <a:off x="2669886" y="6356349"/>
+            <a:ext cx="2482842" cy="365125"/>
+          </a:xfrm>
+        </p:spPr>
         <p:txBody>
           <a:bodyPr/>
           <a:lstStyle/>
           <a:p>
             <a:r>
-              <a:rPr lang="en-US" dirty="0"/>
+              <a:rPr lang="en-ZA" dirty="0"/>
               <a:t>Maurice M. Materise</a:t>
             </a:r>
           </a:p>
@@ -17638,10 +18119,10 @@
       </p:sp>
       <p:sp>
         <p:nvSpPr>
-          <p:cNvPr id="6" name="Slide Number Placeholder 5">
-            <a:extLst>
-              <a:ext uri="{FF2B5EF4-FFF2-40B4-BE49-F238E27FC236}">
-                <a16:creationId xmlns:a16="http://schemas.microsoft.com/office/drawing/2014/main" id="{58E306C7-8000-4F4D-ADDE-80F1776432EF}"/>
+          <p:cNvPr id="4" name="Slide Number Placeholder 3">
+            <a:extLst>
+              <a:ext uri="{FF2B5EF4-FFF2-40B4-BE49-F238E27FC236}">
+                <a16:creationId xmlns:a16="http://schemas.microsoft.com/office/drawing/2014/main" id="{328F602C-7F98-4C02-99D4-ED65E00D66A4}"/>
               </a:ext>
             </a:extLst>
           </p:cNvPr>
@@ -17652,160 +18133,29 @@
             <p:ph type="sldNum" sz="quarter" idx="12"/>
           </p:nvPr>
         </p:nvSpPr>
-        <p:spPr/>
+        <p:spPr>
+          <a:xfrm>
+            <a:off x="5536305" y="6356350"/>
+            <a:ext cx="987552" cy="365125"/>
+          </a:xfrm>
+        </p:spPr>
         <p:txBody>
           <a:bodyPr/>
           <a:lstStyle/>
           <a:p>
-            <a:fld id="{B5CEABB6-07DC-46E8-9B57-56EC44A396E5}" type="slidenum">
-              <a:rPr lang="en-US" smtClean="0"/>
+            <a:fld id="{19B51A1E-902D-48AF-9020-955120F399B6}" type="slidenum">
+              <a:rPr lang="en-ZA" smtClean="0"/>
+              <a:pPr/>
               <a:t>4</a:t>
             </a:fld>
-            <a:endParaRPr lang="en-US" dirty="0"/>
-          </a:p>
-        </p:txBody>
-      </p:sp>
-      <p:pic>
-        <p:nvPicPr>
-          <p:cNvPr id="8" name="Picture 7">
-            <a:extLst>
-              <a:ext uri="{FF2B5EF4-FFF2-40B4-BE49-F238E27FC236}">
-                <a16:creationId xmlns:a16="http://schemas.microsoft.com/office/drawing/2014/main" id="{38CDD230-0026-498F-9961-BAD68379C5BE}"/>
-              </a:ext>
-            </a:extLst>
-          </p:cNvPr>
-          <p:cNvPicPr>
-            <a:picLocks noChangeAspect="1"/>
-          </p:cNvPicPr>
-          <p:nvPr/>
-        </p:nvPicPr>
-        <p:blipFill>
-          <a:blip r:embed="rId2"/>
-          <a:stretch>
-            <a:fillRect/>
-          </a:stretch>
-        </p:blipFill>
-        <p:spPr>
-          <a:xfrm>
-            <a:off x="854169" y="634461"/>
-            <a:ext cx="5454461" cy="5273597"/>
-          </a:xfrm>
-          <a:prstGeom prst="rect">
-            <a:avLst/>
-          </a:prstGeom>
-        </p:spPr>
-      </p:pic>
-      <p:sp>
-        <p:nvSpPr>
-          <p:cNvPr id="9" name="TextBox 8">
-            <a:extLst>
-              <a:ext uri="{FF2B5EF4-FFF2-40B4-BE49-F238E27FC236}">
-                <a16:creationId xmlns:a16="http://schemas.microsoft.com/office/drawing/2014/main" id="{83B14F4F-B3D3-48D9-AB07-088E7DB7681C}"/>
-              </a:ext>
-            </a:extLst>
-          </p:cNvPr>
-          <p:cNvSpPr txBox="1"/>
-          <p:nvPr/>
-        </p:nvSpPr>
-        <p:spPr>
-          <a:xfrm>
-            <a:off x="854169" y="6037882"/>
-            <a:ext cx="5111750" cy="276999"/>
-          </a:xfrm>
-          <a:prstGeom prst="rect">
-            <a:avLst/>
-          </a:prstGeom>
-          <a:noFill/>
-        </p:spPr>
-        <p:txBody>
-          <a:bodyPr wrap="square" rtlCol="0">
-            <a:spAutoFit/>
-          </a:bodyPr>
-          <a:lstStyle/>
-          <a:p>
-            <a:r>
-              <a:rPr lang="en-US" sz="1200" dirty="0"/>
-              <a:t>Code: </a:t>
-            </a:r>
-            <a:r>
-              <a:rPr lang="en-US" sz="1200" dirty="0">
-                <a:hlinkClick r:id="rId3"/>
-              </a:rPr>
-              <a:t>https://github.com/materimm/SAS/blob/main/employees.py</a:t>
-            </a:r>
-            <a:endParaRPr lang="en-US" sz="1200" dirty="0"/>
-          </a:p>
-        </p:txBody>
-      </p:sp>
-      <p:pic>
-        <p:nvPicPr>
-          <p:cNvPr id="11" name="Picture 10">
-            <a:extLst>
-              <a:ext uri="{FF2B5EF4-FFF2-40B4-BE49-F238E27FC236}">
-                <a16:creationId xmlns:a16="http://schemas.microsoft.com/office/drawing/2014/main" id="{60E0F10A-87F3-42C1-9DDC-601ABAC32D00}"/>
-              </a:ext>
-            </a:extLst>
-          </p:cNvPr>
-          <p:cNvPicPr>
-            <a:picLocks noChangeAspect="1"/>
-          </p:cNvPicPr>
-          <p:nvPr/>
-        </p:nvPicPr>
-        <p:blipFill>
-          <a:blip r:embed="rId4"/>
-          <a:stretch>
-            <a:fillRect/>
-          </a:stretch>
-        </p:blipFill>
-        <p:spPr>
-          <a:xfrm>
-            <a:off x="7251693" y="972770"/>
-            <a:ext cx="2092944" cy="4821126"/>
-          </a:xfrm>
-          <a:prstGeom prst="rect">
-            <a:avLst/>
-          </a:prstGeom>
-        </p:spPr>
-      </p:pic>
-      <p:sp>
-        <p:nvSpPr>
-          <p:cNvPr id="12" name="TextBox 11">
-            <a:extLst>
-              <a:ext uri="{FF2B5EF4-FFF2-40B4-BE49-F238E27FC236}">
-                <a16:creationId xmlns:a16="http://schemas.microsoft.com/office/drawing/2014/main" id="{D1AB8DBA-6EC4-4C93-8253-1F410634D7E7}"/>
-              </a:ext>
-            </a:extLst>
-          </p:cNvPr>
-          <p:cNvSpPr txBox="1"/>
-          <p:nvPr/>
-        </p:nvSpPr>
-        <p:spPr>
-          <a:xfrm>
-            <a:off x="7169256" y="550829"/>
-            <a:ext cx="1315938" cy="307777"/>
-          </a:xfrm>
-          <a:prstGeom prst="rect">
-            <a:avLst/>
-          </a:prstGeom>
-          <a:noFill/>
-        </p:spPr>
-        <p:txBody>
-          <a:bodyPr wrap="none" rtlCol="0">
-            <a:spAutoFit/>
-          </a:bodyPr>
-          <a:lstStyle/>
-          <a:p>
-            <a:r>
-              <a:rPr lang="en-US" sz="1400" dirty="0"/>
-              <a:t>Example data:</a:t>
-            </a:r>
+            <a:endParaRPr lang="en-ZA" dirty="0"/>
           </a:p>
         </p:txBody>
       </p:sp>
     </p:spTree>
     <p:extLst>
       <p:ext uri="{BB962C8B-B14F-4D97-AF65-F5344CB8AC3E}">
-        <p14:creationId xmlns:p14="http://schemas.microsoft.com/office/powerpoint/2010/main" val="2205510715"/>
+        <p14:creationId xmlns:p14="http://schemas.microsoft.com/office/powerpoint/2010/main" val="2243494996"/>
       </p:ext>
     </p:extLst>
   </p:cSld>
@@ -17837,7 +18187,7 @@
           <p:cNvPr id="2" name="Title 1">
             <a:extLst>
               <a:ext uri="{FF2B5EF4-FFF2-40B4-BE49-F238E27FC236}">
-                <a16:creationId xmlns:a16="http://schemas.microsoft.com/office/drawing/2014/main" id="{5CE54ABB-4929-4810-950B-2DAEA0A5BAB4}"/>
+                <a16:creationId xmlns:a16="http://schemas.microsoft.com/office/drawing/2014/main" id="{75031FE9-9059-4FE8-B4AC-9771F23A1B89}"/>
               </a:ext>
             </a:extLst>
           </p:cNvPr>
@@ -17850,8 +18200,8 @@
         </p:nvSpPr>
         <p:spPr>
           <a:xfrm>
-            <a:off x="1734154" y="436323"/>
-            <a:ext cx="8421688" cy="632221"/>
+            <a:off x="1885156" y="892177"/>
+            <a:ext cx="8421688" cy="1325563"/>
           </a:xfrm>
         </p:spPr>
         <p:txBody>
@@ -17860,31 +18210,31 @@
           <a:p>
             <a:r>
               <a:rPr lang="en-US" dirty="0"/>
-              <a:t>Test Cases</a:t>
-            </a:r>
-          </a:p>
-        </p:txBody>
-      </p:sp>
-      <p:sp>
-        <p:nvSpPr>
-          <p:cNvPr id="7" name="Content Placeholder 6">
-            <a:extLst>
-              <a:ext uri="{FF2B5EF4-FFF2-40B4-BE49-F238E27FC236}">
-                <a16:creationId xmlns:a16="http://schemas.microsoft.com/office/drawing/2014/main" id="{6B35F89A-6CDF-41F7-BD87-18B45BD7330B}"/>
-              </a:ext>
-            </a:extLst>
-          </p:cNvPr>
-          <p:cNvSpPr>
-            <a:spLocks noGrp="1"/>
-          </p:cNvSpPr>
-          <p:nvPr>
-            <p:ph sz="half" idx="2"/>
-          </p:nvPr>
-        </p:nvSpPr>
-        <p:spPr>
-          <a:xfrm>
-            <a:off x="838200" y="2064529"/>
-            <a:ext cx="2882475" cy="2306135"/>
+              <a:t>Initial Assumptions</a:t>
+            </a:r>
+          </a:p>
+        </p:txBody>
+      </p:sp>
+      <p:sp>
+        <p:nvSpPr>
+          <p:cNvPr id="3" name="Content Placeholder 2">
+            <a:extLst>
+              <a:ext uri="{FF2B5EF4-FFF2-40B4-BE49-F238E27FC236}">
+                <a16:creationId xmlns:a16="http://schemas.microsoft.com/office/drawing/2014/main" id="{D4A2EB3F-4D60-451F-8F45-7D6654D2FCD9}"/>
+              </a:ext>
+            </a:extLst>
+          </p:cNvPr>
+          <p:cNvSpPr>
+            <a:spLocks noGrp="1"/>
+          </p:cNvSpPr>
+          <p:nvPr>
+            <p:ph type="body" sz="quarter" idx="13"/>
+          </p:nvPr>
+        </p:nvSpPr>
+        <p:spPr>
+          <a:xfrm>
+            <a:off x="1485900" y="2563123"/>
+            <a:ext cx="4031945" cy="365125"/>
           </a:xfrm>
         </p:spPr>
         <p:txBody>
@@ -17893,108 +18243,202 @@
           </a:bodyPr>
           <a:lstStyle/>
           <a:p>
-            <a:pPr marL="342900" indent="-342900">
-              <a:buFont typeface="+mj-lt"/>
-              <a:buAutoNum type="arabicPeriod"/>
-            </a:pPr>
-            <a:r>
-              <a:rPr lang="en-ZA" noProof="1"/>
-              <a:t>Basic success</a:t>
-            </a:r>
-          </a:p>
-          <a:p>
-            <a:pPr marL="342900" indent="-342900">
-              <a:buFont typeface="+mj-lt"/>
-              <a:buAutoNum type="arabicPeriod"/>
-            </a:pPr>
-            <a:r>
-              <a:rPr lang="en-ZA" noProof="1"/>
-              <a:t>Null month</a:t>
-            </a:r>
-          </a:p>
-          <a:p>
-            <a:pPr marL="342900" indent="-342900">
-              <a:buFont typeface="+mj-lt"/>
-              <a:buAutoNum type="arabicPeriod"/>
-            </a:pPr>
-            <a:r>
-              <a:rPr lang="en-ZA" noProof="1"/>
-              <a:t>Null employee list</a:t>
-            </a:r>
-          </a:p>
-          <a:p>
-            <a:pPr marL="342900" indent="-342900">
-              <a:buFont typeface="+mj-lt"/>
-              <a:buAutoNum type="arabicPeriod"/>
-            </a:pPr>
-            <a:r>
-              <a:rPr lang="en-ZA" noProof="1"/>
-              <a:t>Bad month type</a:t>
-            </a:r>
-          </a:p>
-          <a:p>
-            <a:pPr marL="342900" indent="-342900">
-              <a:buFont typeface="+mj-lt"/>
-              <a:buAutoNum type="arabicPeriod"/>
-            </a:pPr>
-            <a:r>
-              <a:rPr lang="en-ZA" noProof="1"/>
-              <a:t>Bad employee type</a:t>
-            </a:r>
-          </a:p>
-          <a:p>
-            <a:pPr marL="342900" indent="-342900">
-              <a:buFont typeface="+mj-lt"/>
-              <a:buAutoNum type="arabicPeriod"/>
-            </a:pPr>
-            <a:r>
-              <a:rPr lang="en-ZA" noProof="1"/>
-              <a:t>Empty employee list</a:t>
-            </a:r>
-          </a:p>
-          <a:p>
-            <a:pPr marL="342900" indent="-342900">
-              <a:buFont typeface="+mj-lt"/>
-              <a:buAutoNum type="arabicPeriod"/>
-            </a:pPr>
-            <a:r>
-              <a:rPr lang="en-ZA" noProof="1"/>
-              <a:t>Negative month value</a:t>
-            </a:r>
-          </a:p>
-          <a:p>
-            <a:pPr marL="342900" indent="-342900">
-              <a:buFont typeface="+mj-lt"/>
-              <a:buAutoNum type="arabicPeriod"/>
-            </a:pPr>
-            <a:endParaRPr lang="en-ZA" noProof="1"/>
-          </a:p>
-          <a:p>
-            <a:pPr marL="342900" indent="-342900">
-              <a:buFont typeface="+mj-lt"/>
-              <a:buAutoNum type="arabicPeriod"/>
-            </a:pPr>
-            <a:endParaRPr lang="en-ZA" noProof="1"/>
-          </a:p>
-          <a:p>
-            <a:endParaRPr lang="en-ZA" noProof="1"/>
-          </a:p>
-        </p:txBody>
-      </p:sp>
-      <p:sp>
-        <p:nvSpPr>
-          <p:cNvPr id="9" name="Date Placeholder 8">
-            <a:extLst>
-              <a:ext uri="{FF2B5EF4-FFF2-40B4-BE49-F238E27FC236}">
-                <a16:creationId xmlns:a16="http://schemas.microsoft.com/office/drawing/2014/main" id="{7B78F7A0-88C5-4940-B21C-099F472F39F9}"/>
-              </a:ext>
-            </a:extLst>
-          </p:cNvPr>
-          <p:cNvSpPr>
-            <a:spLocks noGrp="1"/>
-          </p:cNvSpPr>
-          <p:nvPr>
-            <p:ph type="dt" sz="half" idx="10"/>
+            <a:r>
+              <a:rPr lang="en-US" dirty="0"/>
+              <a:t>Data Format</a:t>
+            </a:r>
+          </a:p>
+        </p:txBody>
+      </p:sp>
+      <p:sp>
+        <p:nvSpPr>
+          <p:cNvPr id="4" name="Text Placeholder 3">
+            <a:extLst>
+              <a:ext uri="{FF2B5EF4-FFF2-40B4-BE49-F238E27FC236}">
+                <a16:creationId xmlns:a16="http://schemas.microsoft.com/office/drawing/2014/main" id="{AC1C80FB-53F9-42EE-B1E6-D0F998EC5DFA}"/>
+              </a:ext>
+            </a:extLst>
+          </p:cNvPr>
+          <p:cNvSpPr>
+            <a:spLocks noGrp="1"/>
+          </p:cNvSpPr>
+          <p:nvPr>
+            <p:ph type="body" sz="quarter" idx="15"/>
+          </p:nvPr>
+        </p:nvSpPr>
+        <p:spPr>
+          <a:xfrm>
+            <a:off x="1485664" y="3070348"/>
+            <a:ext cx="4031030" cy="1057308"/>
+          </a:xfrm>
+        </p:spPr>
+        <p:txBody>
+          <a:bodyPr/>
+          <a:lstStyle/>
+          <a:p>
+            <a:r>
+              <a:rPr lang="en-US" dirty="0"/>
+              <a:t>The data is in a JSON format with key value pairs for employee details.</a:t>
+            </a:r>
+          </a:p>
+        </p:txBody>
+      </p:sp>
+      <p:sp>
+        <p:nvSpPr>
+          <p:cNvPr id="5" name="Text Placeholder 4">
+            <a:extLst>
+              <a:ext uri="{FF2B5EF4-FFF2-40B4-BE49-F238E27FC236}">
+                <a16:creationId xmlns:a16="http://schemas.microsoft.com/office/drawing/2014/main" id="{E81BA2B5-6A90-4204-ABDD-7183FBB03A02}"/>
+              </a:ext>
+            </a:extLst>
+          </p:cNvPr>
+          <p:cNvSpPr>
+            <a:spLocks noGrp="1"/>
+          </p:cNvSpPr>
+          <p:nvPr>
+            <p:ph type="body" sz="quarter" idx="16"/>
+          </p:nvPr>
+        </p:nvSpPr>
+        <p:spPr>
+          <a:xfrm>
+            <a:off x="6673004" y="2563123"/>
+            <a:ext cx="4031945" cy="365125"/>
+          </a:xfrm>
+        </p:spPr>
+        <p:txBody>
+          <a:bodyPr>
+            <a:normAutofit lnSpcReduction="10000"/>
+          </a:bodyPr>
+          <a:lstStyle/>
+          <a:p>
+            <a:r>
+              <a:rPr lang="en-US" dirty="0"/>
+              <a:t>Use Case</a:t>
+            </a:r>
+          </a:p>
+        </p:txBody>
+      </p:sp>
+      <p:sp>
+        <p:nvSpPr>
+          <p:cNvPr id="6" name="Text Placeholder 5">
+            <a:extLst>
+              <a:ext uri="{FF2B5EF4-FFF2-40B4-BE49-F238E27FC236}">
+                <a16:creationId xmlns:a16="http://schemas.microsoft.com/office/drawing/2014/main" id="{7E7D4C34-22A0-4D54-A07D-E1E9A11463E5}"/>
+              </a:ext>
+            </a:extLst>
+          </p:cNvPr>
+          <p:cNvSpPr>
+            <a:spLocks noGrp="1"/>
+          </p:cNvSpPr>
+          <p:nvPr>
+            <p:ph type="body" sz="quarter" idx="17"/>
+          </p:nvPr>
+        </p:nvSpPr>
+        <p:spPr>
+          <a:xfrm>
+            <a:off x="6673143" y="3070348"/>
+            <a:ext cx="4031030" cy="1057308"/>
+          </a:xfrm>
+        </p:spPr>
+        <p:txBody>
+          <a:bodyPr/>
+          <a:lstStyle/>
+          <a:p>
+            <a:r>
+              <a:rPr lang="en-US" dirty="0"/>
+              <a:t>The object is simply to view which employees have birthdays in a select month. HR would want results in a UI, not from a command line result. </a:t>
+            </a:r>
+          </a:p>
+          <a:p>
+            <a:endParaRPr lang="en-US" dirty="0"/>
+          </a:p>
+        </p:txBody>
+      </p:sp>
+      <p:sp>
+        <p:nvSpPr>
+          <p:cNvPr id="7" name="Text Placeholder 6">
+            <a:extLst>
+              <a:ext uri="{FF2B5EF4-FFF2-40B4-BE49-F238E27FC236}">
+                <a16:creationId xmlns:a16="http://schemas.microsoft.com/office/drawing/2014/main" id="{301D392D-FB66-47A0-B628-5ADE822A2CFF}"/>
+              </a:ext>
+            </a:extLst>
+          </p:cNvPr>
+          <p:cNvSpPr>
+            <a:spLocks noGrp="1"/>
+          </p:cNvSpPr>
+          <p:nvPr>
+            <p:ph type="body" sz="quarter" idx="18"/>
+          </p:nvPr>
+        </p:nvSpPr>
+        <p:spPr>
+          <a:xfrm>
+            <a:off x="4038087" y="4459736"/>
+            <a:ext cx="4031945" cy="365125"/>
+          </a:xfrm>
+        </p:spPr>
+        <p:txBody>
+          <a:bodyPr>
+            <a:normAutofit lnSpcReduction="10000"/>
+          </a:bodyPr>
+          <a:lstStyle/>
+          <a:p>
+            <a:r>
+              <a:rPr lang="en-US" dirty="0"/>
+              <a:t>Data is Valid</a:t>
+            </a:r>
+          </a:p>
+        </p:txBody>
+      </p:sp>
+      <p:sp>
+        <p:nvSpPr>
+          <p:cNvPr id="8" name="Text Placeholder 7">
+            <a:extLst>
+              <a:ext uri="{FF2B5EF4-FFF2-40B4-BE49-F238E27FC236}">
+                <a16:creationId xmlns:a16="http://schemas.microsoft.com/office/drawing/2014/main" id="{51C26CE0-2506-4B44-A26F-C12BFA5B18B5}"/>
+              </a:ext>
+            </a:extLst>
+          </p:cNvPr>
+          <p:cNvSpPr>
+            <a:spLocks noGrp="1"/>
+          </p:cNvSpPr>
+          <p:nvPr>
+            <p:ph type="body" sz="quarter" idx="19"/>
+          </p:nvPr>
+        </p:nvSpPr>
+        <p:spPr>
+          <a:xfrm>
+            <a:off x="4038600" y="4966961"/>
+            <a:ext cx="4031030" cy="1057308"/>
+          </a:xfrm>
+        </p:spPr>
+        <p:txBody>
+          <a:bodyPr/>
+          <a:lstStyle/>
+          <a:p>
+            <a:r>
+              <a:rPr lang="en-US" dirty="0"/>
+              <a:t>The data is in valid format. Error checks on the data received not included. I would expect the error checking to occur on data input. </a:t>
+            </a:r>
+          </a:p>
+          <a:p>
+            <a:endParaRPr lang="en-US" dirty="0"/>
+          </a:p>
+        </p:txBody>
+      </p:sp>
+      <p:sp>
+        <p:nvSpPr>
+          <p:cNvPr id="80" name="Date Placeholder 79">
+            <a:extLst>
+              <a:ext uri="{FF2B5EF4-FFF2-40B4-BE49-F238E27FC236}">
+                <a16:creationId xmlns:a16="http://schemas.microsoft.com/office/drawing/2014/main" id="{BC1F9D86-85D8-4FD0-B0D3-47D778722782}"/>
+              </a:ext>
+            </a:extLst>
+          </p:cNvPr>
+          <p:cNvSpPr>
+            <a:spLocks noGrp="1"/>
+          </p:cNvSpPr>
+          <p:nvPr>
+            <p:ph type="dt" sz="half" idx="20"/>
           </p:nvPr>
         </p:nvSpPr>
         <p:spPr>
@@ -18016,18 +18460,18 @@
       </p:sp>
       <p:sp>
         <p:nvSpPr>
-          <p:cNvPr id="10" name="Footer Placeholder 9">
-            <a:extLst>
-              <a:ext uri="{FF2B5EF4-FFF2-40B4-BE49-F238E27FC236}">
-                <a16:creationId xmlns:a16="http://schemas.microsoft.com/office/drawing/2014/main" id="{D2186069-FC8E-433D-9BB4-942220CE8CFB}"/>
-              </a:ext>
-            </a:extLst>
-          </p:cNvPr>
-          <p:cNvSpPr>
-            <a:spLocks noGrp="1"/>
-          </p:cNvSpPr>
-          <p:nvPr>
-            <p:ph type="ftr" sz="quarter" idx="11"/>
+          <p:cNvPr id="81" name="Footer Placeholder 80">
+            <a:extLst>
+              <a:ext uri="{FF2B5EF4-FFF2-40B4-BE49-F238E27FC236}">
+                <a16:creationId xmlns:a16="http://schemas.microsoft.com/office/drawing/2014/main" id="{E94F1D24-E4A1-4B59-B57E-A28453963B88}"/>
+              </a:ext>
+            </a:extLst>
+          </p:cNvPr>
+          <p:cNvSpPr>
+            <a:spLocks noGrp="1"/>
+          </p:cNvSpPr>
+          <p:nvPr>
+            <p:ph type="ftr" sz="quarter" idx="21"/>
           </p:nvPr>
         </p:nvSpPr>
         <p:spPr>
@@ -18049,18 +18493,18 @@
       </p:sp>
       <p:sp>
         <p:nvSpPr>
-          <p:cNvPr id="11" name="Slide Number Placeholder 10">
-            <a:extLst>
-              <a:ext uri="{FF2B5EF4-FFF2-40B4-BE49-F238E27FC236}">
-                <a16:creationId xmlns:a16="http://schemas.microsoft.com/office/drawing/2014/main" id="{BAD5B6F4-0A90-447A-A1AE-D75C934B6B29}"/>
-              </a:ext>
-            </a:extLst>
-          </p:cNvPr>
-          <p:cNvSpPr>
-            <a:spLocks noGrp="1"/>
-          </p:cNvSpPr>
-          <p:nvPr>
-            <p:ph type="sldNum" sz="quarter" idx="12"/>
+          <p:cNvPr id="82" name="Slide Number Placeholder 81">
+            <a:extLst>
+              <a:ext uri="{FF2B5EF4-FFF2-40B4-BE49-F238E27FC236}">
+                <a16:creationId xmlns:a16="http://schemas.microsoft.com/office/drawing/2014/main" id="{CE36A058-BEC2-4BC5-A467-F2EB2A365051}"/>
+              </a:ext>
+            </a:extLst>
+          </p:cNvPr>
+          <p:cNvSpPr>
+            <a:spLocks noGrp="1"/>
+          </p:cNvSpPr>
+          <p:nvPr>
+            <p:ph type="sldNum" sz="quarter" idx="22"/>
           </p:nvPr>
         </p:nvSpPr>
         <p:spPr>
@@ -18082,112 +18526,10 @@
           </a:p>
         </p:txBody>
       </p:sp>
-      <p:pic>
-        <p:nvPicPr>
-          <p:cNvPr id="25" name="Picture 24">
-            <a:extLst>
-              <a:ext uri="{FF2B5EF4-FFF2-40B4-BE49-F238E27FC236}">
-                <a16:creationId xmlns:a16="http://schemas.microsoft.com/office/drawing/2014/main" id="{920259D7-710D-4AFE-9ED8-F6442B4EB77C}"/>
-              </a:ext>
-            </a:extLst>
-          </p:cNvPr>
-          <p:cNvPicPr>
-            <a:picLocks noChangeAspect="1"/>
-          </p:cNvPicPr>
-          <p:nvPr/>
-        </p:nvPicPr>
-        <p:blipFill>
-          <a:blip r:embed="rId2"/>
-          <a:stretch>
-            <a:fillRect/>
-          </a:stretch>
-        </p:blipFill>
-        <p:spPr>
-          <a:xfrm>
-            <a:off x="7332312" y="1400539"/>
-            <a:ext cx="4145860" cy="4056922"/>
-          </a:xfrm>
-          <a:prstGeom prst="rect">
-            <a:avLst/>
-          </a:prstGeom>
-        </p:spPr>
-      </p:pic>
-      <p:pic>
-        <p:nvPicPr>
-          <p:cNvPr id="27" name="Picture 26">
-            <a:extLst>
-              <a:ext uri="{FF2B5EF4-FFF2-40B4-BE49-F238E27FC236}">
-                <a16:creationId xmlns:a16="http://schemas.microsoft.com/office/drawing/2014/main" id="{DB20DDE6-585D-4D8C-BC30-C85737106173}"/>
-              </a:ext>
-            </a:extLst>
-          </p:cNvPr>
-          <p:cNvPicPr>
-            <a:picLocks noChangeAspect="1"/>
-          </p:cNvPicPr>
-          <p:nvPr/>
-        </p:nvPicPr>
-        <p:blipFill>
-          <a:blip r:embed="rId3"/>
-          <a:stretch>
-            <a:fillRect/>
-          </a:stretch>
-        </p:blipFill>
-        <p:spPr>
-          <a:xfrm>
-            <a:off x="3581400" y="1400539"/>
-            <a:ext cx="3324413" cy="4521666"/>
-          </a:xfrm>
-          <a:prstGeom prst="rect">
-            <a:avLst/>
-          </a:prstGeom>
-        </p:spPr>
-      </p:pic>
-      <p:sp>
-        <p:nvSpPr>
-          <p:cNvPr id="28" name="TextBox 27">
-            <a:extLst>
-              <a:ext uri="{FF2B5EF4-FFF2-40B4-BE49-F238E27FC236}">
-                <a16:creationId xmlns:a16="http://schemas.microsoft.com/office/drawing/2014/main" id="{6776297A-2765-4346-9682-43ECFADF29FF}"/>
-              </a:ext>
-            </a:extLst>
-          </p:cNvPr>
-          <p:cNvSpPr txBox="1"/>
-          <p:nvPr/>
-        </p:nvSpPr>
-        <p:spPr>
-          <a:xfrm>
-            <a:off x="838200" y="4560140"/>
-            <a:ext cx="2139753" cy="307777"/>
-          </a:xfrm>
-          <a:prstGeom prst="rect">
-            <a:avLst/>
-          </a:prstGeom>
-          <a:noFill/>
-        </p:spPr>
-        <p:txBody>
-          <a:bodyPr wrap="none" rtlCol="0">
-            <a:spAutoFit/>
-          </a:bodyPr>
-          <a:lstStyle/>
-          <a:p>
-            <a:r>
-              <a:rPr lang="en-US" sz="1400" dirty="0"/>
-              <a:t>Test case library: </a:t>
-            </a:r>
-            <a:r>
-              <a:rPr lang="en-US" sz="1400" dirty="0" err="1">
-                <a:hlinkClick r:id="rId4"/>
-              </a:rPr>
-              <a:t>unittest</a:t>
-            </a:r>
-            <a:endParaRPr lang="en-US" sz="1400" dirty="0"/>
-          </a:p>
-        </p:txBody>
-      </p:sp>
     </p:spTree>
     <p:extLst>
       <p:ext uri="{BB962C8B-B14F-4D97-AF65-F5344CB8AC3E}">
-        <p14:creationId xmlns:p14="http://schemas.microsoft.com/office/powerpoint/2010/main" val="928503436"/>
+        <p14:creationId xmlns:p14="http://schemas.microsoft.com/office/powerpoint/2010/main" val="1593920805"/>
       </p:ext>
     </p:extLst>
   </p:cSld>
@@ -18242,7 +18584,7 @@
           <a:p>
             <a:r>
               <a:rPr lang="en-US" dirty="0"/>
-              <a:t>Example Results</a:t>
+              <a:t>Solution</a:t>
             </a:r>
           </a:p>
         </p:txBody>
@@ -18332,12 +18674,54 @@
           </a:p>
         </p:txBody>
       </p:sp>
+      <p:sp>
+        <p:nvSpPr>
+          <p:cNvPr id="9" name="TextBox 8">
+            <a:extLst>
+              <a:ext uri="{FF2B5EF4-FFF2-40B4-BE49-F238E27FC236}">
+                <a16:creationId xmlns:a16="http://schemas.microsoft.com/office/drawing/2014/main" id="{83B14F4F-B3D3-48D9-AB07-088E7DB7681C}"/>
+              </a:ext>
+            </a:extLst>
+          </p:cNvPr>
+          <p:cNvSpPr txBox="1"/>
+          <p:nvPr/>
+        </p:nvSpPr>
+        <p:spPr>
+          <a:xfrm>
+            <a:off x="854169" y="6037882"/>
+            <a:ext cx="5111750" cy="276999"/>
+          </a:xfrm>
+          <a:prstGeom prst="rect">
+            <a:avLst/>
+          </a:prstGeom>
+          <a:noFill/>
+        </p:spPr>
+        <p:txBody>
+          <a:bodyPr wrap="square" rtlCol="0">
+            <a:spAutoFit/>
+          </a:bodyPr>
+          <a:lstStyle/>
+          <a:p>
+            <a:r>
+              <a:rPr lang="en-US" sz="1200" dirty="0"/>
+              <a:t>Code: </a:t>
+            </a:r>
+            <a:r>
+              <a:rPr lang="en-US" sz="1200" dirty="0">
+                <a:hlinkClick r:id="rId2"/>
+              </a:rPr>
+              <a:t>https://github.com/materimm/SAS/blob/main/employees.py</a:t>
+            </a:r>
+            <a:endParaRPr lang="en-US" sz="1200" dirty="0"/>
+          </a:p>
+        </p:txBody>
+      </p:sp>
       <p:pic>
         <p:nvPicPr>
-          <p:cNvPr id="7" name="Picture 6">
-            <a:extLst>
-              <a:ext uri="{FF2B5EF4-FFF2-40B4-BE49-F238E27FC236}">
-                <a16:creationId xmlns:a16="http://schemas.microsoft.com/office/drawing/2014/main" id="{DEC58796-5F8B-4FD6-902B-4344CC631CFC}"/>
+          <p:cNvPr id="11" name="Picture 10">
+            <a:extLst>
+              <a:ext uri="{FF2B5EF4-FFF2-40B4-BE49-F238E27FC236}">
+                <a16:creationId xmlns:a16="http://schemas.microsoft.com/office/drawing/2014/main" id="{60E0F10A-87F3-42C1-9DDC-601ABAC32D00}"/>
               </a:ext>
             </a:extLst>
           </p:cNvPr>
@@ -18347,15 +18731,80 @@
           <p:nvPr/>
         </p:nvPicPr>
         <p:blipFill>
-          <a:blip r:embed="rId2"/>
+          <a:blip r:embed="rId3"/>
           <a:stretch>
             <a:fillRect/>
           </a:stretch>
         </p:blipFill>
         <p:spPr>
           <a:xfrm>
-            <a:off x="466987" y="1966494"/>
-            <a:ext cx="11258026" cy="1933676"/>
+            <a:off x="7251693" y="972770"/>
+            <a:ext cx="2092944" cy="4821126"/>
+          </a:xfrm>
+          <a:prstGeom prst="rect">
+            <a:avLst/>
+          </a:prstGeom>
+        </p:spPr>
+      </p:pic>
+      <p:sp>
+        <p:nvSpPr>
+          <p:cNvPr id="12" name="TextBox 11">
+            <a:extLst>
+              <a:ext uri="{FF2B5EF4-FFF2-40B4-BE49-F238E27FC236}">
+                <a16:creationId xmlns:a16="http://schemas.microsoft.com/office/drawing/2014/main" id="{D1AB8DBA-6EC4-4C93-8253-1F410634D7E7}"/>
+              </a:ext>
+            </a:extLst>
+          </p:cNvPr>
+          <p:cNvSpPr txBox="1"/>
+          <p:nvPr/>
+        </p:nvSpPr>
+        <p:spPr>
+          <a:xfrm>
+            <a:off x="7169256" y="550829"/>
+            <a:ext cx="1315938" cy="307777"/>
+          </a:xfrm>
+          <a:prstGeom prst="rect">
+            <a:avLst/>
+          </a:prstGeom>
+          <a:noFill/>
+        </p:spPr>
+        <p:txBody>
+          <a:bodyPr wrap="none" rtlCol="0">
+            <a:spAutoFit/>
+          </a:bodyPr>
+          <a:lstStyle/>
+          <a:p>
+            <a:r>
+              <a:rPr lang="en-US" sz="1400" dirty="0"/>
+              <a:t>Example data:</a:t>
+            </a:r>
+          </a:p>
+        </p:txBody>
+      </p:sp>
+      <p:pic>
+        <p:nvPicPr>
+          <p:cNvPr id="7" name="Picture 6">
+            <a:extLst>
+              <a:ext uri="{FF2B5EF4-FFF2-40B4-BE49-F238E27FC236}">
+                <a16:creationId xmlns:a16="http://schemas.microsoft.com/office/drawing/2014/main" id="{40C4C029-1CBE-42FB-B0BC-38C1EB478FB0}"/>
+              </a:ext>
+            </a:extLst>
+          </p:cNvPr>
+          <p:cNvPicPr>
+            <a:picLocks noChangeAspect="1"/>
+          </p:cNvPicPr>
+          <p:nvPr/>
+        </p:nvPicPr>
+        <p:blipFill>
+          <a:blip r:embed="rId4"/>
+          <a:stretch>
+            <a:fillRect/>
+          </a:stretch>
+        </p:blipFill>
+        <p:spPr>
+          <a:xfrm>
+            <a:off x="1087173" y="675930"/>
+            <a:ext cx="5393525" cy="5160981"/>
           </a:xfrm>
           <a:prstGeom prst="rect">
             <a:avLst/>
@@ -18365,7 +18814,7 @@
     </p:spTree>
     <p:extLst>
       <p:ext uri="{BB962C8B-B14F-4D97-AF65-F5344CB8AC3E}">
-        <p14:creationId xmlns:p14="http://schemas.microsoft.com/office/powerpoint/2010/main" val="588154079"/>
+        <p14:creationId xmlns:p14="http://schemas.microsoft.com/office/powerpoint/2010/main" val="2205510715"/>
       </p:ext>
     </p:extLst>
   </p:cSld>
@@ -18394,10 +18843,10 @@
       </p:grpSpPr>
       <p:sp>
         <p:nvSpPr>
-          <p:cNvPr id="4" name="Title 3">
-            <a:extLst>
-              <a:ext uri="{FF2B5EF4-FFF2-40B4-BE49-F238E27FC236}">
-                <a16:creationId xmlns:a16="http://schemas.microsoft.com/office/drawing/2014/main" id="{FAD2AE59-5630-4D5C-83A9-4CDEF4D7DCFB}"/>
+          <p:cNvPr id="2" name="Title 1">
+            <a:extLst>
+              <a:ext uri="{FF2B5EF4-FFF2-40B4-BE49-F238E27FC236}">
+                <a16:creationId xmlns:a16="http://schemas.microsoft.com/office/drawing/2014/main" id="{5CE54ABB-4929-4810-950B-2DAEA0A5BAB4}"/>
               </a:ext>
             </a:extLst>
           </p:cNvPr>
@@ -18410,8 +18859,8 @@
         </p:nvSpPr>
         <p:spPr>
           <a:xfrm>
-            <a:off x="3453818" y="323796"/>
-            <a:ext cx="8421688" cy="701731"/>
+            <a:off x="1734154" y="436323"/>
+            <a:ext cx="8421688" cy="632221"/>
           </a:xfrm>
         </p:spPr>
         <p:txBody>
@@ -18420,17 +18869,133 @@
           <a:p>
             <a:r>
               <a:rPr lang="en-US" dirty="0"/>
-              <a:t>User Interface</a:t>
-            </a:r>
-          </a:p>
-        </p:txBody>
-      </p:sp>
-      <p:sp>
-        <p:nvSpPr>
-          <p:cNvPr id="12" name="Date Placeholder 11">
-            <a:extLst>
-              <a:ext uri="{FF2B5EF4-FFF2-40B4-BE49-F238E27FC236}">
-                <a16:creationId xmlns:a16="http://schemas.microsoft.com/office/drawing/2014/main" id="{5909F2DC-F097-42AB-88E7-0CA09BD5E2C2}"/>
+              <a:t>Test Cases</a:t>
+            </a:r>
+          </a:p>
+        </p:txBody>
+      </p:sp>
+      <p:sp>
+        <p:nvSpPr>
+          <p:cNvPr id="7" name="Content Placeholder 6">
+            <a:extLst>
+              <a:ext uri="{FF2B5EF4-FFF2-40B4-BE49-F238E27FC236}">
+                <a16:creationId xmlns:a16="http://schemas.microsoft.com/office/drawing/2014/main" id="{6B35F89A-6CDF-41F7-BD87-18B45BD7330B}"/>
+              </a:ext>
+            </a:extLst>
+          </p:cNvPr>
+          <p:cNvSpPr>
+            <a:spLocks noGrp="1"/>
+          </p:cNvSpPr>
+          <p:nvPr>
+            <p:ph sz="half" idx="2"/>
+          </p:nvPr>
+        </p:nvSpPr>
+        <p:spPr>
+          <a:xfrm>
+            <a:off x="838200" y="2064529"/>
+            <a:ext cx="2882475" cy="2306135"/>
+          </a:xfrm>
+        </p:spPr>
+        <p:txBody>
+          <a:bodyPr vert="horz" lIns="91440" tIns="45720" rIns="91440" bIns="45720" rtlCol="0" anchor="t">
+            <a:normAutofit lnSpcReduction="10000"/>
+          </a:bodyPr>
+          <a:lstStyle/>
+          <a:p>
+            <a:pPr marL="342900" indent="-342900">
+              <a:buFont typeface="+mj-lt"/>
+              <a:buAutoNum type="arabicPeriod"/>
+            </a:pPr>
+            <a:r>
+              <a:rPr lang="en-ZA" noProof="1"/>
+              <a:t>Basic success</a:t>
+            </a:r>
+          </a:p>
+          <a:p>
+            <a:pPr marL="342900" indent="-342900">
+              <a:buFont typeface="+mj-lt"/>
+              <a:buAutoNum type="arabicPeriod"/>
+            </a:pPr>
+            <a:r>
+              <a:rPr lang="en-ZA" noProof="1"/>
+              <a:t>Null month</a:t>
+            </a:r>
+          </a:p>
+          <a:p>
+            <a:pPr marL="342900" indent="-342900">
+              <a:buFont typeface="+mj-lt"/>
+              <a:buAutoNum type="arabicPeriod"/>
+            </a:pPr>
+            <a:r>
+              <a:rPr lang="en-ZA" noProof="1"/>
+              <a:t>Null employee list</a:t>
+            </a:r>
+          </a:p>
+          <a:p>
+            <a:pPr marL="342900" indent="-342900">
+              <a:buFont typeface="+mj-lt"/>
+              <a:buAutoNum type="arabicPeriod"/>
+            </a:pPr>
+            <a:r>
+              <a:rPr lang="en-ZA" noProof="1"/>
+              <a:t>Bad month type</a:t>
+            </a:r>
+          </a:p>
+          <a:p>
+            <a:pPr marL="342900" indent="-342900">
+              <a:buFont typeface="+mj-lt"/>
+              <a:buAutoNum type="arabicPeriod"/>
+            </a:pPr>
+            <a:r>
+              <a:rPr lang="en-ZA" noProof="1"/>
+              <a:t>Bad employee type</a:t>
+            </a:r>
+          </a:p>
+          <a:p>
+            <a:pPr marL="342900" indent="-342900">
+              <a:buFont typeface="+mj-lt"/>
+              <a:buAutoNum type="arabicPeriod"/>
+            </a:pPr>
+            <a:r>
+              <a:rPr lang="en-ZA" noProof="1"/>
+              <a:t>Empty employee list</a:t>
+            </a:r>
+          </a:p>
+          <a:p>
+            <a:pPr marL="342900" indent="-342900">
+              <a:buFont typeface="+mj-lt"/>
+              <a:buAutoNum type="arabicPeriod"/>
+            </a:pPr>
+            <a:r>
+              <a:rPr lang="en-ZA" noProof="1"/>
+              <a:t>Negative month value</a:t>
+            </a:r>
+          </a:p>
+          <a:p>
+            <a:pPr marL="342900" indent="-342900">
+              <a:buFont typeface="+mj-lt"/>
+              <a:buAutoNum type="arabicPeriod"/>
+            </a:pPr>
+            <a:endParaRPr lang="en-ZA" noProof="1"/>
+          </a:p>
+          <a:p>
+            <a:pPr marL="342900" indent="-342900">
+              <a:buFont typeface="+mj-lt"/>
+              <a:buAutoNum type="arabicPeriod"/>
+            </a:pPr>
+            <a:endParaRPr lang="en-ZA" noProof="1"/>
+          </a:p>
+          <a:p>
+            <a:endParaRPr lang="en-ZA" noProof="1"/>
+          </a:p>
+        </p:txBody>
+      </p:sp>
+      <p:sp>
+        <p:nvSpPr>
+          <p:cNvPr id="9" name="Date Placeholder 8">
+            <a:extLst>
+              <a:ext uri="{FF2B5EF4-FFF2-40B4-BE49-F238E27FC236}">
+                <a16:creationId xmlns:a16="http://schemas.microsoft.com/office/drawing/2014/main" id="{7B78F7A0-88C5-4940-B21C-099F472F39F9}"/>
               </a:ext>
             </a:extLst>
           </p:cNvPr>
@@ -18460,10 +19025,10 @@
       </p:sp>
       <p:sp>
         <p:nvSpPr>
-          <p:cNvPr id="13" name="Footer Placeholder 12">
-            <a:extLst>
-              <a:ext uri="{FF2B5EF4-FFF2-40B4-BE49-F238E27FC236}">
-                <a16:creationId xmlns:a16="http://schemas.microsoft.com/office/drawing/2014/main" id="{F4A37AA9-0BEE-42AC-8CC0-AE5B8663553A}"/>
+          <p:cNvPr id="10" name="Footer Placeholder 9">
+            <a:extLst>
+              <a:ext uri="{FF2B5EF4-FFF2-40B4-BE49-F238E27FC236}">
+                <a16:creationId xmlns:a16="http://schemas.microsoft.com/office/drawing/2014/main" id="{D2186069-FC8E-433D-9BB4-942220CE8CFB}"/>
               </a:ext>
             </a:extLst>
           </p:cNvPr>
@@ -18493,10 +19058,10 @@
       </p:sp>
       <p:sp>
         <p:nvSpPr>
-          <p:cNvPr id="14" name="Slide Number Placeholder 13">
-            <a:extLst>
-              <a:ext uri="{FF2B5EF4-FFF2-40B4-BE49-F238E27FC236}">
-                <a16:creationId xmlns:a16="http://schemas.microsoft.com/office/drawing/2014/main" id="{42152A75-1CD2-44EC-9374-C83D4604A5DD}"/>
+          <p:cNvPr id="11" name="Slide Number Placeholder 10">
+            <a:extLst>
+              <a:ext uri="{FF2B5EF4-FFF2-40B4-BE49-F238E27FC236}">
+                <a16:creationId xmlns:a16="http://schemas.microsoft.com/office/drawing/2014/main" id="{BAD5B6F4-0A90-447A-A1AE-D75C934B6B29}"/>
               </a:ext>
             </a:extLst>
           </p:cNvPr>
@@ -18528,10 +19093,10 @@
       </p:sp>
       <p:pic>
         <p:nvPicPr>
-          <p:cNvPr id="19" name="Picture 18">
-            <a:extLst>
-              <a:ext uri="{FF2B5EF4-FFF2-40B4-BE49-F238E27FC236}">
-                <a16:creationId xmlns:a16="http://schemas.microsoft.com/office/drawing/2014/main" id="{40EE927D-2B74-4D7A-9EF5-B14B73EE1E24}"/>
+          <p:cNvPr id="25" name="Picture 24">
+            <a:extLst>
+              <a:ext uri="{FF2B5EF4-FFF2-40B4-BE49-F238E27FC236}">
+                <a16:creationId xmlns:a16="http://schemas.microsoft.com/office/drawing/2014/main" id="{920259D7-710D-4AFE-9ED8-F6442B4EB77C}"/>
               </a:ext>
             </a:extLst>
           </p:cNvPr>
@@ -18548,8 +19113,80 @@
         </p:blipFill>
         <p:spPr>
           <a:xfrm>
-            <a:off x="683749" y="1508893"/>
-            <a:ext cx="10824501" cy="3096664"/>
+            <a:off x="7332312" y="1400539"/>
+            <a:ext cx="4145860" cy="4056922"/>
+          </a:xfrm>
+          <a:prstGeom prst="rect">
+            <a:avLst/>
+          </a:prstGeom>
+        </p:spPr>
+      </p:pic>
+      <p:sp>
+        <p:nvSpPr>
+          <p:cNvPr id="28" name="TextBox 27">
+            <a:extLst>
+              <a:ext uri="{FF2B5EF4-FFF2-40B4-BE49-F238E27FC236}">
+                <a16:creationId xmlns:a16="http://schemas.microsoft.com/office/drawing/2014/main" id="{6776297A-2765-4346-9682-43ECFADF29FF}"/>
+              </a:ext>
+            </a:extLst>
+          </p:cNvPr>
+          <p:cNvSpPr txBox="1"/>
+          <p:nvPr/>
+        </p:nvSpPr>
+        <p:spPr>
+          <a:xfrm>
+            <a:off x="838200" y="4560140"/>
+            <a:ext cx="2139753" cy="307777"/>
+          </a:xfrm>
+          <a:prstGeom prst="rect">
+            <a:avLst/>
+          </a:prstGeom>
+          <a:noFill/>
+        </p:spPr>
+        <p:txBody>
+          <a:bodyPr wrap="none" rtlCol="0">
+            <a:spAutoFit/>
+          </a:bodyPr>
+          <a:lstStyle/>
+          <a:p>
+            <a:r>
+              <a:rPr lang="en-US" sz="1400" dirty="0"/>
+              <a:t>Test case library: </a:t>
+            </a:r>
+            <a:r>
+              <a:rPr lang="en-US" sz="1400" dirty="0" err="1">
+                <a:hlinkClick r:id="rId3"/>
+              </a:rPr>
+              <a:t>unittest</a:t>
+            </a:r>
+            <a:endParaRPr lang="en-US" sz="1400" dirty="0"/>
+          </a:p>
+        </p:txBody>
+      </p:sp>
+      <p:pic>
+        <p:nvPicPr>
+          <p:cNvPr id="4" name="Picture 3">
+            <a:extLst>
+              <a:ext uri="{FF2B5EF4-FFF2-40B4-BE49-F238E27FC236}">
+                <a16:creationId xmlns:a16="http://schemas.microsoft.com/office/drawing/2014/main" id="{941921DB-959E-4605-BDFE-38AD852CB9A6}"/>
+              </a:ext>
+            </a:extLst>
+          </p:cNvPr>
+          <p:cNvPicPr>
+            <a:picLocks noChangeAspect="1"/>
+          </p:cNvPicPr>
+          <p:nvPr/>
+        </p:nvPicPr>
+        <p:blipFill>
+          <a:blip r:embed="rId4"/>
+          <a:stretch>
+            <a:fillRect/>
+          </a:stretch>
+        </p:blipFill>
+        <p:spPr>
+          <a:xfrm>
+            <a:off x="3472648" y="1400539"/>
+            <a:ext cx="3497339" cy="4867917"/>
           </a:xfrm>
           <a:prstGeom prst="rect">
             <a:avLst/>
@@ -18559,7 +19196,7 @@
     </p:spTree>
     <p:extLst>
       <p:ext uri="{BB962C8B-B14F-4D97-AF65-F5344CB8AC3E}">
-        <p14:creationId xmlns:p14="http://schemas.microsoft.com/office/powerpoint/2010/main" val="4151694508"/>
+        <p14:creationId xmlns:p14="http://schemas.microsoft.com/office/powerpoint/2010/main" val="928503436"/>
       </p:ext>
     </p:extLst>
   </p:cSld>
@@ -18588,10 +19225,10 @@
       </p:grpSpPr>
       <p:sp>
         <p:nvSpPr>
-          <p:cNvPr id="4" name="Title 3">
-            <a:extLst>
-              <a:ext uri="{FF2B5EF4-FFF2-40B4-BE49-F238E27FC236}">
-                <a16:creationId xmlns:a16="http://schemas.microsoft.com/office/drawing/2014/main" id="{FAD2AE59-5630-4D5C-83A9-4CDEF4D7DCFB}"/>
+          <p:cNvPr id="2" name="Title 1">
+            <a:extLst>
+              <a:ext uri="{FF2B5EF4-FFF2-40B4-BE49-F238E27FC236}">
+                <a16:creationId xmlns:a16="http://schemas.microsoft.com/office/drawing/2014/main" id="{C08430A9-DC95-4C2E-A35E-5B916BED03A9}"/>
               </a:ext>
             </a:extLst>
           </p:cNvPr>
@@ -18604,8 +19241,8 @@
         </p:nvSpPr>
         <p:spPr>
           <a:xfrm>
-            <a:off x="3453818" y="323796"/>
-            <a:ext cx="8421688" cy="701731"/>
+            <a:off x="3245841" y="0"/>
+            <a:ext cx="5111750" cy="634461"/>
           </a:xfrm>
         </p:spPr>
         <p:txBody>
@@ -18614,17 +19251,17 @@
           <a:p>
             <a:r>
               <a:rPr lang="en-US" dirty="0"/>
-              <a:t>User Interface</a:t>
-            </a:r>
-          </a:p>
-        </p:txBody>
-      </p:sp>
-      <p:sp>
-        <p:nvSpPr>
-          <p:cNvPr id="12" name="Date Placeholder 11">
-            <a:extLst>
-              <a:ext uri="{FF2B5EF4-FFF2-40B4-BE49-F238E27FC236}">
-                <a16:creationId xmlns:a16="http://schemas.microsoft.com/office/drawing/2014/main" id="{5909F2DC-F097-42AB-88E7-0CA09BD5E2C2}"/>
+              <a:t>Example Results</a:t>
+            </a:r>
+          </a:p>
+        </p:txBody>
+      </p:sp>
+      <p:sp>
+        <p:nvSpPr>
+          <p:cNvPr id="4" name="Date Placeholder 3">
+            <a:extLst>
+              <a:ext uri="{FF2B5EF4-FFF2-40B4-BE49-F238E27FC236}">
+                <a16:creationId xmlns:a16="http://schemas.microsoft.com/office/drawing/2014/main" id="{11834FF8-8017-4A7D-90FA-F3B78626C6D4}"/>
               </a:ext>
             </a:extLst>
           </p:cNvPr>
@@ -18635,12 +19272,7 @@
             <p:ph type="dt" sz="half" idx="10"/>
           </p:nvPr>
         </p:nvSpPr>
-        <p:spPr>
-          <a:xfrm>
-            <a:off x="838200" y="6356350"/>
-            <a:ext cx="2743200" cy="365125"/>
-          </a:xfrm>
-        </p:spPr>
+        <p:spPr/>
         <p:txBody>
           <a:bodyPr/>
           <a:lstStyle/>
@@ -18654,10 +19286,10 @@
       </p:sp>
       <p:sp>
         <p:nvSpPr>
-          <p:cNvPr id="13" name="Footer Placeholder 12">
-            <a:extLst>
-              <a:ext uri="{FF2B5EF4-FFF2-40B4-BE49-F238E27FC236}">
-                <a16:creationId xmlns:a16="http://schemas.microsoft.com/office/drawing/2014/main" id="{F4A37AA9-0BEE-42AC-8CC0-AE5B8663553A}"/>
+          <p:cNvPr id="5" name="Footer Placeholder 4">
+            <a:extLst>
+              <a:ext uri="{FF2B5EF4-FFF2-40B4-BE49-F238E27FC236}">
+                <a16:creationId xmlns:a16="http://schemas.microsoft.com/office/drawing/2014/main" id="{47937E5B-465E-4F29-8E25-6FF11094FF97}"/>
               </a:ext>
             </a:extLst>
           </p:cNvPr>
@@ -18668,12 +19300,7 @@
             <p:ph type="ftr" sz="quarter" idx="11"/>
           </p:nvPr>
         </p:nvSpPr>
-        <p:spPr>
-          <a:xfrm>
-            <a:off x="4038600" y="6356350"/>
-            <a:ext cx="4114800" cy="365125"/>
-          </a:xfrm>
-        </p:spPr>
+        <p:spPr/>
         <p:txBody>
           <a:bodyPr/>
           <a:lstStyle/>
@@ -18687,10 +19314,10 @@
       </p:sp>
       <p:sp>
         <p:nvSpPr>
-          <p:cNvPr id="14" name="Slide Number Placeholder 13">
-            <a:extLst>
-              <a:ext uri="{FF2B5EF4-FFF2-40B4-BE49-F238E27FC236}">
-                <a16:creationId xmlns:a16="http://schemas.microsoft.com/office/drawing/2014/main" id="{42152A75-1CD2-44EC-9374-C83D4604A5DD}"/>
+          <p:cNvPr id="6" name="Slide Number Placeholder 5">
+            <a:extLst>
+              <a:ext uri="{FF2B5EF4-FFF2-40B4-BE49-F238E27FC236}">
+                <a16:creationId xmlns:a16="http://schemas.microsoft.com/office/drawing/2014/main" id="{58E306C7-8000-4F4D-ADDE-80F1776432EF}"/>
               </a:ext>
             </a:extLst>
           </p:cNvPr>
@@ -18701,19 +19328,13 @@
             <p:ph type="sldNum" sz="quarter" idx="12"/>
           </p:nvPr>
         </p:nvSpPr>
-        <p:spPr>
-          <a:xfrm>
-            <a:off x="8610600" y="6356350"/>
-            <a:ext cx="2743200" cy="365125"/>
-          </a:xfrm>
-        </p:spPr>
+        <p:spPr/>
         <p:txBody>
           <a:bodyPr/>
           <a:lstStyle/>
           <a:p>
             <a:fld id="{B5CEABB6-07DC-46E8-9B57-56EC44A396E5}" type="slidenum">
               <a:rPr lang="en-US" smtClean="0"/>
-              <a:pPr/>
               <a:t>8</a:t>
             </a:fld>
             <a:endParaRPr lang="en-US" dirty="0"/>
@@ -18722,10 +19343,10 @@
       </p:sp>
       <p:pic>
         <p:nvPicPr>
-          <p:cNvPr id="3" name="Picture 2">
-            <a:extLst>
-              <a:ext uri="{FF2B5EF4-FFF2-40B4-BE49-F238E27FC236}">
-                <a16:creationId xmlns:a16="http://schemas.microsoft.com/office/drawing/2014/main" id="{3497C26B-D156-40C1-9AFF-E6C589814A82}"/>
+          <p:cNvPr id="8" name="Picture 7">
+            <a:extLst>
+              <a:ext uri="{FF2B5EF4-FFF2-40B4-BE49-F238E27FC236}">
+                <a16:creationId xmlns:a16="http://schemas.microsoft.com/office/drawing/2014/main" id="{FA816AB9-FA66-419B-8A73-CDDE2FDD9759}"/>
               </a:ext>
             </a:extLst>
           </p:cNvPr>
@@ -18742,8 +19363,8 @@
         </p:blipFill>
         <p:spPr>
           <a:xfrm>
-            <a:off x="471181" y="1183048"/>
-            <a:ext cx="11249637" cy="4748474"/>
+            <a:off x="373904" y="2159696"/>
+            <a:ext cx="11444191" cy="1932910"/>
           </a:xfrm>
           <a:prstGeom prst="rect">
             <a:avLst/>
@@ -18753,7 +19374,7 @@
     </p:spTree>
     <p:extLst>
       <p:ext uri="{BB962C8B-B14F-4D97-AF65-F5344CB8AC3E}">
-        <p14:creationId xmlns:p14="http://schemas.microsoft.com/office/powerpoint/2010/main" val="4023078651"/>
+        <p14:creationId xmlns:p14="http://schemas.microsoft.com/office/powerpoint/2010/main" val="588154079"/>
       </p:ext>
     </p:extLst>
   </p:cSld>
@@ -18916,10 +19537,10 @@
       </p:sp>
       <p:pic>
         <p:nvPicPr>
-          <p:cNvPr id="5" name="Picture 4">
-            <a:extLst>
-              <a:ext uri="{FF2B5EF4-FFF2-40B4-BE49-F238E27FC236}">
-                <a16:creationId xmlns:a16="http://schemas.microsoft.com/office/drawing/2014/main" id="{5E716540-09D3-45B2-B361-3A31EFEDAB15}"/>
+          <p:cNvPr id="19" name="Picture 18">
+            <a:extLst>
+              <a:ext uri="{FF2B5EF4-FFF2-40B4-BE49-F238E27FC236}">
+                <a16:creationId xmlns:a16="http://schemas.microsoft.com/office/drawing/2014/main" id="{40EE927D-2B74-4D7A-9EF5-B14B73EE1E24}"/>
               </a:ext>
             </a:extLst>
           </p:cNvPr>
@@ -18936,8 +19557,8 @@
         </p:blipFill>
         <p:spPr>
           <a:xfrm>
-            <a:off x="1045827" y="1440370"/>
-            <a:ext cx="10100345" cy="3378319"/>
+            <a:off x="683749" y="1508893"/>
+            <a:ext cx="10824501" cy="3096664"/>
           </a:xfrm>
           <a:prstGeom prst="rect">
             <a:avLst/>
@@ -18947,7 +19568,7 @@
     </p:spTree>
     <p:extLst>
       <p:ext uri="{BB962C8B-B14F-4D97-AF65-F5344CB8AC3E}">
-        <p14:creationId xmlns:p14="http://schemas.microsoft.com/office/powerpoint/2010/main" val="3045026754"/>
+        <p14:creationId xmlns:p14="http://schemas.microsoft.com/office/powerpoint/2010/main" val="4151694508"/>
       </p:ext>
     </p:extLst>
   </p:cSld>
@@ -19749,22 +20370,12 @@
 </file>
 
 <file path=customXml/item1.xml><?xml version="1.0" encoding="utf-8"?>
-<p:properties xmlns:p="http://schemas.microsoft.com/office/2006/metadata/properties" xmlns:xsi="http://www.w3.org/2001/XMLSchema-instance" xmlns:pc="http://schemas.microsoft.com/office/infopath/2007/PartnerControls">
-  <documentManagement>
-    <_ip_UnifiedCompliancePolicyUIAction xmlns="http://schemas.microsoft.com/sharepoint/v3" xsi:nil="true"/>
-    <Image xmlns="71af3243-3dd4-4a8d-8c0d-dd76da1f02a5">
-      <Url xsi:nil="true"/>
-      <Description xsi:nil="true"/>
-    </Image>
-    <Status xmlns="71af3243-3dd4-4a8d-8c0d-dd76da1f02a5">Not started</Status>
-    <_ip_UnifiedCompliancePolicyProperties xmlns="http://schemas.microsoft.com/sharepoint/v3" xsi:nil="true"/>
-    <ImageTagsTaxHTField xmlns="71af3243-3dd4-4a8d-8c0d-dd76da1f02a5">
-      <Terms xmlns="http://schemas.microsoft.com/office/infopath/2007/PartnerControls"/>
-    </ImageTagsTaxHTField>
-    <TaxCatchAll xmlns="230e9df3-be65-4c73-a93b-d1236ebd677e"/>
-    <MediaServiceKeyPoints xmlns="71af3243-3dd4-4a8d-8c0d-dd76da1f02a5" xsi:nil="true"/>
-  </documentManagement>
-</p:properties>
+<?mso-contentType ?>
+<FormTemplates xmlns="http://schemas.microsoft.com/sharepoint/v3/contenttype/forms">
+  <Display>DocumentLibraryForm</Display>
+  <Edit>DocumentLibraryForm</Edit>
+  <New>DocumentLibraryForm</New>
+</FormTemplates>
 </file>
 
 <file path=customXml/item2.xml><?xml version="1.0" encoding="utf-8"?>
@@ -20044,22 +20655,28 @@
 </file>
 
 <file path=customXml/item3.xml><?xml version="1.0" encoding="utf-8"?>
-<?mso-contentType ?>
-<FormTemplates xmlns="http://schemas.microsoft.com/sharepoint/v3/contenttype/forms">
-  <Display>DocumentLibraryForm</Display>
-  <Edit>DocumentLibraryForm</Edit>
-  <New>DocumentLibraryForm</New>
-</FormTemplates>
+<p:properties xmlns:p="http://schemas.microsoft.com/office/2006/metadata/properties" xmlns:xsi="http://www.w3.org/2001/XMLSchema-instance" xmlns:pc="http://schemas.microsoft.com/office/infopath/2007/PartnerControls">
+  <documentManagement>
+    <_ip_UnifiedCompliancePolicyUIAction xmlns="http://schemas.microsoft.com/sharepoint/v3" xsi:nil="true"/>
+    <Image xmlns="71af3243-3dd4-4a8d-8c0d-dd76da1f02a5">
+      <Url xsi:nil="true"/>
+      <Description xsi:nil="true"/>
+    </Image>
+    <Status xmlns="71af3243-3dd4-4a8d-8c0d-dd76da1f02a5">Not started</Status>
+    <_ip_UnifiedCompliancePolicyProperties xmlns="http://schemas.microsoft.com/sharepoint/v3" xsi:nil="true"/>
+    <ImageTagsTaxHTField xmlns="71af3243-3dd4-4a8d-8c0d-dd76da1f02a5">
+      <Terms xmlns="http://schemas.microsoft.com/office/infopath/2007/PartnerControls"/>
+    </ImageTagsTaxHTField>
+    <TaxCatchAll xmlns="230e9df3-be65-4c73-a93b-d1236ebd677e"/>
+    <MediaServiceKeyPoints xmlns="71af3243-3dd4-4a8d-8c0d-dd76da1f02a5" xsi:nil="true"/>
+  </documentManagement>
+</p:properties>
 </file>
 
 <file path=customXml/itemProps1.xml><?xml version="1.0" encoding="utf-8"?>
-<ds:datastoreItem xmlns:ds="http://schemas.openxmlformats.org/officeDocument/2006/customXml" ds:itemID="{7F97B18F-50BC-4F30-8373-93489E845F83}">
+<ds:datastoreItem xmlns:ds="http://schemas.openxmlformats.org/officeDocument/2006/customXml" ds:itemID="{42BC90D6-94CF-42F7-AAC4-9CF6824C54D5}">
   <ds:schemaRefs>
-    <ds:schemaRef ds:uri="http://schemas.microsoft.com/office/2006/metadata/properties"/>
-    <ds:schemaRef ds:uri="http://schemas.microsoft.com/office/infopath/2007/PartnerControls"/>
-    <ds:schemaRef ds:uri="http://schemas.microsoft.com/sharepoint/v3"/>
-    <ds:schemaRef ds:uri="71af3243-3dd4-4a8d-8c0d-dd76da1f02a5"/>
-    <ds:schemaRef ds:uri="230e9df3-be65-4c73-a93b-d1236ebd677e"/>
+    <ds:schemaRef ds:uri="http://schemas.microsoft.com/sharepoint/v3/contenttype/forms"/>
   </ds:schemaRefs>
 </ds:datastoreItem>
 </file>
@@ -20086,9 +20703,13 @@
 </file>
 
 <file path=customXml/itemProps3.xml><?xml version="1.0" encoding="utf-8"?>
-<ds:datastoreItem xmlns:ds="http://schemas.openxmlformats.org/officeDocument/2006/customXml" ds:itemID="{42BC90D6-94CF-42F7-AAC4-9CF6824C54D5}">
+<ds:datastoreItem xmlns:ds="http://schemas.openxmlformats.org/officeDocument/2006/customXml" ds:itemID="{7F97B18F-50BC-4F30-8373-93489E845F83}">
   <ds:schemaRefs>
-    <ds:schemaRef ds:uri="http://schemas.microsoft.com/sharepoint/v3/contenttype/forms"/>
+    <ds:schemaRef ds:uri="http://schemas.microsoft.com/office/2006/metadata/properties"/>
+    <ds:schemaRef ds:uri="http://schemas.microsoft.com/office/infopath/2007/PartnerControls"/>
+    <ds:schemaRef ds:uri="http://schemas.microsoft.com/sharepoint/v3"/>
+    <ds:schemaRef ds:uri="71af3243-3dd4-4a8d-8c0d-dd76da1f02a5"/>
+    <ds:schemaRef ds:uri="230e9df3-be65-4c73-a93b-d1236ebd677e"/>
   </ds:schemaRefs>
 </ds:datastoreItem>
 </file>

</xml_diff>